<commit_message>
dashboard dan slide presentasi
</commit_message>
<xml_diff>
--- a/FinalProject_Pmsteyol.pptx
+++ b/FinalProject_Pmsteyol.pptx
@@ -3175,6 +3175,813 @@
   <dgm:styleLbl name="fgShp">
     <dgm:fillClrLst meth="repeat">
       <a:schemeClr val="accent1">
+        <a:tint val="60000"/>
+      </a:schemeClr>
+    </dgm:fillClrLst>
+    <dgm:linClrLst meth="repeat">
+      <a:schemeClr val="lt1"/>
+    </dgm:linClrLst>
+    <dgm:effectClrLst/>
+    <dgm:txLinClrLst/>
+    <dgm:txFillClrLst meth="repeat">
+      <a:schemeClr val="dk1"/>
+    </dgm:txFillClrLst>
+    <dgm:txEffectClrLst/>
+  </dgm:styleLbl>
+  <dgm:styleLbl name="revTx">
+    <dgm:fillClrLst meth="repeat">
+      <a:schemeClr val="lt1">
+        <a:alpha val="0"/>
+      </a:schemeClr>
+    </dgm:fillClrLst>
+    <dgm:linClrLst meth="repeat">
+      <a:schemeClr val="dk1">
+        <a:alpha val="0"/>
+      </a:schemeClr>
+    </dgm:linClrLst>
+    <dgm:effectClrLst/>
+    <dgm:txLinClrLst/>
+    <dgm:txFillClrLst meth="repeat">
+      <a:schemeClr val="tx1"/>
+    </dgm:txFillClrLst>
+    <dgm:txEffectClrLst/>
+  </dgm:styleLbl>
+</dgm:colorsDef>
+</file>
+
+<file path=ppt/diagrams/colors5.xml><?xml version="1.0" encoding="utf-8"?>
+<dgm:colorsDef xmlns:dgm="http://schemas.openxmlformats.org/drawingml/2006/diagram" xmlns:a="http://schemas.openxmlformats.org/drawingml/2006/main" uniqueId="urn:microsoft.com/office/officeart/2005/8/colors/accent0_1">
+  <dgm:title val=""/>
+  <dgm:desc val=""/>
+  <dgm:catLst>
+    <dgm:cat type="mainScheme" pri="10100"/>
+  </dgm:catLst>
+  <dgm:styleLbl name="node0">
+    <dgm:fillClrLst meth="repeat">
+      <a:schemeClr val="lt1"/>
+    </dgm:fillClrLst>
+    <dgm:linClrLst meth="repeat">
+      <a:schemeClr val="dk1">
+        <a:shade val="80000"/>
+      </a:schemeClr>
+    </dgm:linClrLst>
+    <dgm:effectClrLst/>
+    <dgm:txLinClrLst/>
+    <dgm:txFillClrLst meth="repeat">
+      <a:schemeClr val="dk1"/>
+    </dgm:txFillClrLst>
+    <dgm:txEffectClrLst/>
+  </dgm:styleLbl>
+  <dgm:styleLbl name="node1">
+    <dgm:fillClrLst meth="repeat">
+      <a:schemeClr val="lt1"/>
+    </dgm:fillClrLst>
+    <dgm:linClrLst meth="repeat">
+      <a:schemeClr val="dk1">
+        <a:shade val="80000"/>
+      </a:schemeClr>
+    </dgm:linClrLst>
+    <dgm:effectClrLst/>
+    <dgm:txLinClrLst/>
+    <dgm:txFillClrLst meth="repeat">
+      <a:schemeClr val="dk1"/>
+    </dgm:txFillClrLst>
+    <dgm:txEffectClrLst/>
+  </dgm:styleLbl>
+  <dgm:styleLbl name="alignNode1">
+    <dgm:fillClrLst meth="repeat">
+      <a:schemeClr val="lt1"/>
+    </dgm:fillClrLst>
+    <dgm:linClrLst meth="repeat">
+      <a:schemeClr val="dk1">
+        <a:shade val="80000"/>
+      </a:schemeClr>
+    </dgm:linClrLst>
+    <dgm:effectClrLst/>
+    <dgm:txLinClrLst/>
+    <dgm:txFillClrLst meth="repeat">
+      <a:schemeClr val="dk1"/>
+    </dgm:txFillClrLst>
+    <dgm:txEffectClrLst/>
+  </dgm:styleLbl>
+  <dgm:styleLbl name="lnNode1">
+    <dgm:fillClrLst meth="repeat">
+      <a:schemeClr val="lt1"/>
+    </dgm:fillClrLst>
+    <dgm:linClrLst meth="repeat">
+      <a:schemeClr val="dk1">
+        <a:shade val="80000"/>
+      </a:schemeClr>
+    </dgm:linClrLst>
+    <dgm:effectClrLst/>
+    <dgm:txLinClrLst/>
+    <dgm:txFillClrLst meth="repeat">
+      <a:schemeClr val="dk1"/>
+    </dgm:txFillClrLst>
+    <dgm:txEffectClrLst/>
+  </dgm:styleLbl>
+  <dgm:styleLbl name="vennNode1">
+    <dgm:fillClrLst meth="repeat">
+      <a:schemeClr val="lt1">
+        <a:alpha val="50000"/>
+      </a:schemeClr>
+    </dgm:fillClrLst>
+    <dgm:linClrLst meth="repeat">
+      <a:schemeClr val="dk1">
+        <a:shade val="80000"/>
+      </a:schemeClr>
+    </dgm:linClrLst>
+    <dgm:effectClrLst/>
+    <dgm:txLinClrLst/>
+    <dgm:txFillClrLst/>
+    <dgm:txEffectClrLst/>
+  </dgm:styleLbl>
+  <dgm:styleLbl name="node2">
+    <dgm:fillClrLst meth="repeat">
+      <a:schemeClr val="lt1"/>
+    </dgm:fillClrLst>
+    <dgm:linClrLst meth="repeat">
+      <a:schemeClr val="dk1">
+        <a:shade val="80000"/>
+      </a:schemeClr>
+    </dgm:linClrLst>
+    <dgm:effectClrLst/>
+    <dgm:txLinClrLst/>
+    <dgm:txFillClrLst meth="repeat">
+      <a:schemeClr val="dk1"/>
+    </dgm:txFillClrLst>
+    <dgm:txEffectClrLst/>
+  </dgm:styleLbl>
+  <dgm:styleLbl name="node3">
+    <dgm:fillClrLst meth="repeat">
+      <a:schemeClr val="lt1"/>
+    </dgm:fillClrLst>
+    <dgm:linClrLst meth="repeat">
+      <a:schemeClr val="dk1">
+        <a:shade val="80000"/>
+      </a:schemeClr>
+    </dgm:linClrLst>
+    <dgm:effectClrLst/>
+    <dgm:txLinClrLst/>
+    <dgm:txFillClrLst meth="repeat">
+      <a:schemeClr val="dk1"/>
+    </dgm:txFillClrLst>
+    <dgm:txEffectClrLst/>
+  </dgm:styleLbl>
+  <dgm:styleLbl name="node4">
+    <dgm:fillClrLst meth="repeat">
+      <a:schemeClr val="lt1"/>
+    </dgm:fillClrLst>
+    <dgm:linClrLst meth="repeat">
+      <a:schemeClr val="dk1">
+        <a:shade val="80000"/>
+      </a:schemeClr>
+    </dgm:linClrLst>
+    <dgm:effectClrLst/>
+    <dgm:txLinClrLst/>
+    <dgm:txFillClrLst meth="repeat">
+      <a:schemeClr val="dk1"/>
+    </dgm:txFillClrLst>
+    <dgm:txEffectClrLst/>
+  </dgm:styleLbl>
+  <dgm:styleLbl name="fgImgPlace1">
+    <dgm:fillClrLst meth="repeat">
+      <a:schemeClr val="dk1">
+        <a:tint val="40000"/>
+      </a:schemeClr>
+    </dgm:fillClrLst>
+    <dgm:linClrLst meth="repeat">
+      <a:schemeClr val="dk1">
+        <a:shade val="80000"/>
+      </a:schemeClr>
+    </dgm:linClrLst>
+    <dgm:effectClrLst/>
+    <dgm:txLinClrLst/>
+    <dgm:txFillClrLst meth="repeat">
+      <a:schemeClr val="lt1"/>
+    </dgm:txFillClrLst>
+    <dgm:txEffectClrLst/>
+  </dgm:styleLbl>
+  <dgm:styleLbl name="alignImgPlace1">
+    <dgm:fillClrLst meth="repeat">
+      <a:schemeClr val="dk1">
+        <a:tint val="40000"/>
+      </a:schemeClr>
+    </dgm:fillClrLst>
+    <dgm:linClrLst meth="repeat">
+      <a:schemeClr val="dk1">
+        <a:shade val="80000"/>
+      </a:schemeClr>
+    </dgm:linClrLst>
+    <dgm:effectClrLst/>
+    <dgm:txLinClrLst/>
+    <dgm:txFillClrLst meth="repeat">
+      <a:schemeClr val="lt1"/>
+    </dgm:txFillClrLst>
+    <dgm:txEffectClrLst/>
+  </dgm:styleLbl>
+  <dgm:styleLbl name="bgImgPlace1">
+    <dgm:fillClrLst meth="repeat">
+      <a:schemeClr val="dk1">
+        <a:tint val="40000"/>
+      </a:schemeClr>
+    </dgm:fillClrLst>
+    <dgm:linClrLst meth="repeat">
+      <a:schemeClr val="dk1">
+        <a:shade val="80000"/>
+      </a:schemeClr>
+    </dgm:linClrLst>
+    <dgm:effectClrLst/>
+    <dgm:txLinClrLst/>
+    <dgm:txFillClrLst meth="repeat">
+      <a:schemeClr val="lt1"/>
+    </dgm:txFillClrLst>
+    <dgm:txEffectClrLst/>
+  </dgm:styleLbl>
+  <dgm:styleLbl name="sibTrans2D1">
+    <dgm:fillClrLst meth="repeat">
+      <a:schemeClr val="dk1">
+        <a:tint val="60000"/>
+      </a:schemeClr>
+    </dgm:fillClrLst>
+    <dgm:linClrLst meth="repeat">
+      <a:schemeClr val="dk1">
+        <a:tint val="60000"/>
+      </a:schemeClr>
+    </dgm:linClrLst>
+    <dgm:effectClrLst/>
+    <dgm:txLinClrLst/>
+    <dgm:txFillClrLst meth="repeat">
+      <a:schemeClr val="dk1"/>
+    </dgm:txFillClrLst>
+    <dgm:txEffectClrLst/>
+  </dgm:styleLbl>
+  <dgm:styleLbl name="fgSibTrans2D1">
+    <dgm:fillClrLst meth="repeat">
+      <a:schemeClr val="dk1">
+        <a:tint val="60000"/>
+      </a:schemeClr>
+    </dgm:fillClrLst>
+    <dgm:linClrLst meth="repeat">
+      <a:schemeClr val="dk1">
+        <a:tint val="60000"/>
+      </a:schemeClr>
+    </dgm:linClrLst>
+    <dgm:effectClrLst/>
+    <dgm:txLinClrLst/>
+    <dgm:txFillClrLst meth="repeat">
+      <a:schemeClr val="dk1"/>
+    </dgm:txFillClrLst>
+    <dgm:txEffectClrLst/>
+  </dgm:styleLbl>
+  <dgm:styleLbl name="bgSibTrans2D1">
+    <dgm:fillClrLst meth="repeat">
+      <a:schemeClr val="dk1">
+        <a:tint val="60000"/>
+      </a:schemeClr>
+    </dgm:fillClrLst>
+    <dgm:linClrLst meth="repeat">
+      <a:schemeClr val="dk1">
+        <a:tint val="60000"/>
+      </a:schemeClr>
+    </dgm:linClrLst>
+    <dgm:effectClrLst/>
+    <dgm:txLinClrLst/>
+    <dgm:txFillClrLst meth="repeat">
+      <a:schemeClr val="dk1"/>
+    </dgm:txFillClrLst>
+    <dgm:txEffectClrLst/>
+  </dgm:styleLbl>
+  <dgm:styleLbl name="sibTrans1D1">
+    <dgm:fillClrLst meth="repeat">
+      <a:schemeClr val="dk1"/>
+    </dgm:fillClrLst>
+    <dgm:linClrLst meth="repeat">
+      <a:schemeClr val="dk1"/>
+    </dgm:linClrLst>
+    <dgm:effectClrLst/>
+    <dgm:txLinClrLst/>
+    <dgm:txFillClrLst meth="repeat">
+      <a:schemeClr val="tx1"/>
+    </dgm:txFillClrLst>
+    <dgm:txEffectClrLst/>
+  </dgm:styleLbl>
+  <dgm:styleLbl name="callout">
+    <dgm:fillClrLst meth="repeat">
+      <a:schemeClr val="dk1"/>
+    </dgm:fillClrLst>
+    <dgm:linClrLst meth="repeat">
+      <a:schemeClr val="dk1"/>
+    </dgm:linClrLst>
+    <dgm:effectClrLst/>
+    <dgm:txLinClrLst/>
+    <dgm:txFillClrLst meth="repeat">
+      <a:schemeClr val="tx1"/>
+    </dgm:txFillClrLst>
+    <dgm:txEffectClrLst/>
+  </dgm:styleLbl>
+  <dgm:styleLbl name="asst0">
+    <dgm:fillClrLst meth="repeat">
+      <a:schemeClr val="lt1"/>
+    </dgm:fillClrLst>
+    <dgm:linClrLst meth="repeat">
+      <a:schemeClr val="dk1">
+        <a:shade val="80000"/>
+      </a:schemeClr>
+    </dgm:linClrLst>
+    <dgm:effectClrLst/>
+    <dgm:txLinClrLst/>
+    <dgm:txFillClrLst meth="repeat">
+      <a:schemeClr val="dk1"/>
+    </dgm:txFillClrLst>
+    <dgm:txEffectClrLst/>
+  </dgm:styleLbl>
+  <dgm:styleLbl name="asst1">
+    <dgm:fillClrLst meth="repeat">
+      <a:schemeClr val="lt1"/>
+    </dgm:fillClrLst>
+    <dgm:linClrLst meth="repeat">
+      <a:schemeClr val="dk1">
+        <a:shade val="80000"/>
+      </a:schemeClr>
+    </dgm:linClrLst>
+    <dgm:effectClrLst/>
+    <dgm:txLinClrLst/>
+    <dgm:txFillClrLst meth="repeat">
+      <a:schemeClr val="dk1"/>
+    </dgm:txFillClrLst>
+    <dgm:txEffectClrLst/>
+  </dgm:styleLbl>
+  <dgm:styleLbl name="asst2">
+    <dgm:fillClrLst meth="repeat">
+      <a:schemeClr val="lt1"/>
+    </dgm:fillClrLst>
+    <dgm:linClrLst meth="repeat">
+      <a:schemeClr val="dk1">
+        <a:shade val="80000"/>
+      </a:schemeClr>
+    </dgm:linClrLst>
+    <dgm:effectClrLst/>
+    <dgm:txLinClrLst/>
+    <dgm:txFillClrLst meth="repeat">
+      <a:schemeClr val="dk1"/>
+    </dgm:txFillClrLst>
+    <dgm:txEffectClrLst/>
+  </dgm:styleLbl>
+  <dgm:styleLbl name="asst3">
+    <dgm:fillClrLst meth="repeat">
+      <a:schemeClr val="lt1"/>
+    </dgm:fillClrLst>
+    <dgm:linClrLst meth="repeat">
+      <a:schemeClr val="dk1">
+        <a:shade val="80000"/>
+      </a:schemeClr>
+    </dgm:linClrLst>
+    <dgm:effectClrLst/>
+    <dgm:txLinClrLst/>
+    <dgm:txFillClrLst meth="repeat">
+      <a:schemeClr val="dk1"/>
+    </dgm:txFillClrLst>
+    <dgm:txEffectClrLst/>
+  </dgm:styleLbl>
+  <dgm:styleLbl name="asst4">
+    <dgm:fillClrLst meth="repeat">
+      <a:schemeClr val="lt1"/>
+    </dgm:fillClrLst>
+    <dgm:linClrLst meth="repeat">
+      <a:schemeClr val="dk1">
+        <a:shade val="80000"/>
+      </a:schemeClr>
+    </dgm:linClrLst>
+    <dgm:effectClrLst/>
+    <dgm:txLinClrLst/>
+    <dgm:txFillClrLst meth="repeat">
+      <a:schemeClr val="dk1"/>
+    </dgm:txFillClrLst>
+    <dgm:txEffectClrLst/>
+  </dgm:styleLbl>
+  <dgm:styleLbl name="parChTrans2D1">
+    <dgm:fillClrLst meth="repeat">
+      <a:schemeClr val="dk1">
+        <a:tint val="60000"/>
+      </a:schemeClr>
+    </dgm:fillClrLst>
+    <dgm:linClrLst meth="repeat">
+      <a:schemeClr val="dk1">
+        <a:tint val="60000"/>
+      </a:schemeClr>
+    </dgm:linClrLst>
+    <dgm:effectClrLst/>
+    <dgm:txLinClrLst/>
+    <dgm:txFillClrLst/>
+    <dgm:txEffectClrLst/>
+  </dgm:styleLbl>
+  <dgm:styleLbl name="parChTrans2D2">
+    <dgm:fillClrLst meth="repeat">
+      <a:schemeClr val="dk1"/>
+    </dgm:fillClrLst>
+    <dgm:linClrLst meth="repeat">
+      <a:schemeClr val="dk1"/>
+    </dgm:linClrLst>
+    <dgm:effectClrLst/>
+    <dgm:txLinClrLst/>
+    <dgm:txFillClrLst/>
+    <dgm:txEffectClrLst/>
+  </dgm:styleLbl>
+  <dgm:styleLbl name="parChTrans2D3">
+    <dgm:fillClrLst meth="repeat">
+      <a:schemeClr val="dk1"/>
+    </dgm:fillClrLst>
+    <dgm:linClrLst meth="repeat">
+      <a:schemeClr val="dk1"/>
+    </dgm:linClrLst>
+    <dgm:effectClrLst/>
+    <dgm:txLinClrLst/>
+    <dgm:txFillClrLst/>
+    <dgm:txEffectClrLst/>
+  </dgm:styleLbl>
+  <dgm:styleLbl name="parChTrans2D4">
+    <dgm:fillClrLst meth="repeat">
+      <a:schemeClr val="dk1"/>
+    </dgm:fillClrLst>
+    <dgm:linClrLst meth="repeat">
+      <a:schemeClr val="dk1"/>
+    </dgm:linClrLst>
+    <dgm:effectClrLst/>
+    <dgm:txLinClrLst/>
+    <dgm:txFillClrLst meth="repeat">
+      <a:schemeClr val="lt1"/>
+    </dgm:txFillClrLst>
+    <dgm:txEffectClrLst/>
+  </dgm:styleLbl>
+  <dgm:styleLbl name="parChTrans1D1">
+    <dgm:fillClrLst meth="repeat">
+      <a:schemeClr val="dk1"/>
+    </dgm:fillClrLst>
+    <dgm:linClrLst meth="repeat">
+      <a:schemeClr val="dk1">
+        <a:shade val="60000"/>
+      </a:schemeClr>
+    </dgm:linClrLst>
+    <dgm:effectClrLst/>
+    <dgm:txLinClrLst/>
+    <dgm:txFillClrLst meth="repeat">
+      <a:schemeClr val="tx1"/>
+    </dgm:txFillClrLst>
+    <dgm:txEffectClrLst/>
+  </dgm:styleLbl>
+  <dgm:styleLbl name="parChTrans1D2">
+    <dgm:fillClrLst meth="repeat">
+      <a:schemeClr val="dk1"/>
+    </dgm:fillClrLst>
+    <dgm:linClrLst meth="repeat">
+      <a:schemeClr val="dk1">
+        <a:shade val="60000"/>
+      </a:schemeClr>
+    </dgm:linClrLst>
+    <dgm:effectClrLst/>
+    <dgm:txLinClrLst/>
+    <dgm:txFillClrLst meth="repeat">
+      <a:schemeClr val="tx1"/>
+    </dgm:txFillClrLst>
+    <dgm:txEffectClrLst/>
+  </dgm:styleLbl>
+  <dgm:styleLbl name="parChTrans1D3">
+    <dgm:fillClrLst meth="repeat">
+      <a:schemeClr val="dk1"/>
+    </dgm:fillClrLst>
+    <dgm:linClrLst meth="repeat">
+      <a:schemeClr val="dk1">
+        <a:shade val="80000"/>
+      </a:schemeClr>
+    </dgm:linClrLst>
+    <dgm:effectClrLst/>
+    <dgm:txLinClrLst/>
+    <dgm:txFillClrLst meth="repeat">
+      <a:schemeClr val="tx1"/>
+    </dgm:txFillClrLst>
+    <dgm:txEffectClrLst/>
+  </dgm:styleLbl>
+  <dgm:styleLbl name="parChTrans1D4">
+    <dgm:fillClrLst meth="repeat">
+      <a:schemeClr val="dk1"/>
+    </dgm:fillClrLst>
+    <dgm:linClrLst meth="repeat">
+      <a:schemeClr val="dk1">
+        <a:shade val="80000"/>
+      </a:schemeClr>
+    </dgm:linClrLst>
+    <dgm:effectClrLst/>
+    <dgm:txLinClrLst/>
+    <dgm:txFillClrLst meth="repeat">
+      <a:schemeClr val="tx1"/>
+    </dgm:txFillClrLst>
+    <dgm:txEffectClrLst/>
+  </dgm:styleLbl>
+  <dgm:styleLbl name="fgAcc1">
+    <dgm:fillClrLst meth="repeat">
+      <a:schemeClr val="dk1">
+        <a:alpha val="90000"/>
+        <a:tint val="40000"/>
+      </a:schemeClr>
+    </dgm:fillClrLst>
+    <dgm:linClrLst meth="repeat">
+      <a:schemeClr val="dk1"/>
+    </dgm:linClrLst>
+    <dgm:effectClrLst/>
+    <dgm:txLinClrLst/>
+    <dgm:txFillClrLst meth="repeat">
+      <a:schemeClr val="dk1"/>
+    </dgm:txFillClrLst>
+    <dgm:txEffectClrLst/>
+  </dgm:styleLbl>
+  <dgm:styleLbl name="conFgAcc1">
+    <dgm:fillClrLst meth="repeat">
+      <a:schemeClr val="dk1">
+        <a:alpha val="90000"/>
+        <a:tint val="40000"/>
+      </a:schemeClr>
+    </dgm:fillClrLst>
+    <dgm:linClrLst meth="repeat">
+      <a:schemeClr val="dk1"/>
+    </dgm:linClrLst>
+    <dgm:effectClrLst/>
+    <dgm:txLinClrLst/>
+    <dgm:txFillClrLst meth="repeat">
+      <a:schemeClr val="dk1"/>
+    </dgm:txFillClrLst>
+    <dgm:txEffectClrLst/>
+  </dgm:styleLbl>
+  <dgm:styleLbl name="alignAcc1">
+    <dgm:fillClrLst meth="repeat">
+      <a:schemeClr val="dk1">
+        <a:alpha val="90000"/>
+        <a:tint val="40000"/>
+      </a:schemeClr>
+    </dgm:fillClrLst>
+    <dgm:linClrLst meth="repeat">
+      <a:schemeClr val="dk1"/>
+    </dgm:linClrLst>
+    <dgm:effectClrLst/>
+    <dgm:txLinClrLst/>
+    <dgm:txFillClrLst meth="repeat">
+      <a:schemeClr val="dk1"/>
+    </dgm:txFillClrLst>
+    <dgm:txEffectClrLst/>
+  </dgm:styleLbl>
+  <dgm:styleLbl name="trAlignAcc1">
+    <dgm:fillClrLst meth="repeat">
+      <a:schemeClr val="dk1">
+        <a:alpha val="40000"/>
+        <a:tint val="40000"/>
+      </a:schemeClr>
+    </dgm:fillClrLst>
+    <dgm:linClrLst meth="repeat">
+      <a:schemeClr val="dk1"/>
+    </dgm:linClrLst>
+    <dgm:effectClrLst/>
+    <dgm:txLinClrLst/>
+    <dgm:txFillClrLst meth="repeat">
+      <a:schemeClr val="dk1"/>
+    </dgm:txFillClrLst>
+    <dgm:txEffectClrLst/>
+  </dgm:styleLbl>
+  <dgm:styleLbl name="bgAcc1">
+    <dgm:fillClrLst meth="repeat">
+      <a:schemeClr val="dk1">
+        <a:alpha val="90000"/>
+        <a:tint val="40000"/>
+      </a:schemeClr>
+    </dgm:fillClrLst>
+    <dgm:linClrLst meth="repeat">
+      <a:schemeClr val="dk1"/>
+    </dgm:linClrLst>
+    <dgm:effectClrLst/>
+    <dgm:txLinClrLst/>
+    <dgm:txFillClrLst meth="repeat">
+      <a:schemeClr val="dk1"/>
+    </dgm:txFillClrLst>
+    <dgm:txEffectClrLst/>
+  </dgm:styleLbl>
+  <dgm:styleLbl name="solidFgAcc1">
+    <dgm:fillClrLst meth="repeat">
+      <a:schemeClr val="lt1"/>
+    </dgm:fillClrLst>
+    <dgm:linClrLst meth="repeat">
+      <a:schemeClr val="dk1"/>
+    </dgm:linClrLst>
+    <dgm:effectClrLst/>
+    <dgm:txLinClrLst/>
+    <dgm:txFillClrLst meth="repeat">
+      <a:schemeClr val="dk1"/>
+    </dgm:txFillClrLst>
+    <dgm:txEffectClrLst/>
+  </dgm:styleLbl>
+  <dgm:styleLbl name="solidAlignAcc1">
+    <dgm:fillClrLst meth="repeat">
+      <a:schemeClr val="lt1"/>
+    </dgm:fillClrLst>
+    <dgm:linClrLst meth="repeat">
+      <a:schemeClr val="dk1"/>
+    </dgm:linClrLst>
+    <dgm:effectClrLst/>
+    <dgm:txLinClrLst/>
+    <dgm:txFillClrLst meth="repeat">
+      <a:schemeClr val="dk1"/>
+    </dgm:txFillClrLst>
+    <dgm:txEffectClrLst/>
+  </dgm:styleLbl>
+  <dgm:styleLbl name="solidBgAcc1">
+    <dgm:fillClrLst meth="repeat">
+      <a:schemeClr val="lt1"/>
+    </dgm:fillClrLst>
+    <dgm:linClrLst meth="repeat">
+      <a:schemeClr val="dk1"/>
+    </dgm:linClrLst>
+    <dgm:effectClrLst/>
+    <dgm:txLinClrLst/>
+    <dgm:txFillClrLst meth="repeat">
+      <a:schemeClr val="dk1"/>
+    </dgm:txFillClrLst>
+    <dgm:txEffectClrLst/>
+  </dgm:styleLbl>
+  <dgm:styleLbl name="fgAccFollowNode1">
+    <dgm:fillClrLst meth="repeat">
+      <a:schemeClr val="lt1">
+        <a:alpha val="90000"/>
+        <a:tint val="40000"/>
+      </a:schemeClr>
+    </dgm:fillClrLst>
+    <dgm:linClrLst meth="repeat">
+      <a:schemeClr val="dk1">
+        <a:alpha val="90000"/>
+      </a:schemeClr>
+    </dgm:linClrLst>
+    <dgm:effectClrLst/>
+    <dgm:txLinClrLst/>
+    <dgm:txFillClrLst meth="repeat">
+      <a:schemeClr val="dk1"/>
+    </dgm:txFillClrLst>
+    <dgm:txEffectClrLst/>
+  </dgm:styleLbl>
+  <dgm:styleLbl name="alignAccFollowNode1">
+    <dgm:fillClrLst meth="repeat">
+      <a:schemeClr val="lt1">
+        <a:alpha val="90000"/>
+        <a:tint val="40000"/>
+      </a:schemeClr>
+    </dgm:fillClrLst>
+    <dgm:linClrLst meth="repeat">
+      <a:schemeClr val="dk1">
+        <a:alpha val="90000"/>
+      </a:schemeClr>
+    </dgm:linClrLst>
+    <dgm:effectClrLst/>
+    <dgm:txLinClrLst/>
+    <dgm:txFillClrLst meth="repeat">
+      <a:schemeClr val="dk1"/>
+    </dgm:txFillClrLst>
+    <dgm:txEffectClrLst/>
+  </dgm:styleLbl>
+  <dgm:styleLbl name="bgAccFollowNode1">
+    <dgm:fillClrLst meth="repeat">
+      <a:schemeClr val="lt1">
+        <a:alpha val="90000"/>
+        <a:tint val="40000"/>
+      </a:schemeClr>
+    </dgm:fillClrLst>
+    <dgm:linClrLst meth="repeat">
+      <a:schemeClr val="dk1">
+        <a:alpha val="90000"/>
+      </a:schemeClr>
+    </dgm:linClrLst>
+    <dgm:effectClrLst/>
+    <dgm:txLinClrLst/>
+    <dgm:txFillClrLst meth="repeat">
+      <a:schemeClr val="dk1"/>
+    </dgm:txFillClrLst>
+    <dgm:txEffectClrLst/>
+  </dgm:styleLbl>
+  <dgm:styleLbl name="fgAcc0">
+    <dgm:fillClrLst meth="repeat">
+      <a:schemeClr val="dk1">
+        <a:alpha val="90000"/>
+        <a:tint val="40000"/>
+      </a:schemeClr>
+    </dgm:fillClrLst>
+    <dgm:linClrLst meth="repeat">
+      <a:schemeClr val="dk1"/>
+    </dgm:linClrLst>
+    <dgm:effectClrLst/>
+    <dgm:txLinClrLst/>
+    <dgm:txFillClrLst meth="repeat">
+      <a:schemeClr val="dk1"/>
+    </dgm:txFillClrLst>
+    <dgm:txEffectClrLst/>
+  </dgm:styleLbl>
+  <dgm:styleLbl name="fgAcc2">
+    <dgm:fillClrLst meth="repeat">
+      <a:schemeClr val="dk1">
+        <a:alpha val="90000"/>
+        <a:tint val="40000"/>
+      </a:schemeClr>
+    </dgm:fillClrLst>
+    <dgm:linClrLst meth="repeat">
+      <a:schemeClr val="dk1"/>
+    </dgm:linClrLst>
+    <dgm:effectClrLst/>
+    <dgm:txLinClrLst/>
+    <dgm:txFillClrLst meth="repeat">
+      <a:schemeClr val="dk1"/>
+    </dgm:txFillClrLst>
+    <dgm:txEffectClrLst/>
+  </dgm:styleLbl>
+  <dgm:styleLbl name="fgAcc3">
+    <dgm:fillClrLst meth="repeat">
+      <a:schemeClr val="dk1">
+        <a:alpha val="90000"/>
+        <a:tint val="40000"/>
+      </a:schemeClr>
+    </dgm:fillClrLst>
+    <dgm:linClrLst meth="repeat">
+      <a:schemeClr val="dk1"/>
+    </dgm:linClrLst>
+    <dgm:effectClrLst/>
+    <dgm:txLinClrLst/>
+    <dgm:txFillClrLst meth="repeat">
+      <a:schemeClr val="dk1"/>
+    </dgm:txFillClrLst>
+    <dgm:txEffectClrLst/>
+  </dgm:styleLbl>
+  <dgm:styleLbl name="fgAcc4">
+    <dgm:fillClrLst meth="repeat">
+      <a:schemeClr val="dk1">
+        <a:alpha val="90000"/>
+        <a:tint val="40000"/>
+      </a:schemeClr>
+    </dgm:fillClrLst>
+    <dgm:linClrLst meth="repeat">
+      <a:schemeClr val="dk1"/>
+    </dgm:linClrLst>
+    <dgm:effectClrLst/>
+    <dgm:txLinClrLst/>
+    <dgm:txFillClrLst meth="repeat">
+      <a:schemeClr val="dk1"/>
+    </dgm:txFillClrLst>
+    <dgm:txEffectClrLst/>
+  </dgm:styleLbl>
+  <dgm:styleLbl name="bgShp">
+    <dgm:fillClrLst meth="repeat">
+      <a:schemeClr val="dk1">
+        <a:tint val="40000"/>
+      </a:schemeClr>
+    </dgm:fillClrLst>
+    <dgm:linClrLst meth="repeat">
+      <a:schemeClr val="dk1"/>
+    </dgm:linClrLst>
+    <dgm:effectClrLst/>
+    <dgm:txLinClrLst/>
+    <dgm:txFillClrLst meth="repeat">
+      <a:schemeClr val="dk1"/>
+    </dgm:txFillClrLst>
+    <dgm:txEffectClrLst/>
+  </dgm:styleLbl>
+  <dgm:styleLbl name="dkBgShp">
+    <dgm:fillClrLst meth="repeat">
+      <a:schemeClr val="dk1">
+        <a:shade val="80000"/>
+      </a:schemeClr>
+    </dgm:fillClrLst>
+    <dgm:linClrLst meth="repeat">
+      <a:schemeClr val="dk1"/>
+    </dgm:linClrLst>
+    <dgm:effectClrLst/>
+    <dgm:txLinClrLst/>
+    <dgm:txFillClrLst meth="repeat">
+      <a:schemeClr val="lt1"/>
+    </dgm:txFillClrLst>
+    <dgm:txEffectClrLst/>
+  </dgm:styleLbl>
+  <dgm:styleLbl name="trBgShp">
+    <dgm:fillClrLst meth="repeat">
+      <a:schemeClr val="dk1">
+        <a:tint val="50000"/>
+        <a:alpha val="40000"/>
+      </a:schemeClr>
+    </dgm:fillClrLst>
+    <dgm:linClrLst meth="repeat">
+      <a:schemeClr val="dk1"/>
+    </dgm:linClrLst>
+    <dgm:effectClrLst/>
+    <dgm:txLinClrLst/>
+    <dgm:txFillClrLst meth="repeat">
+      <a:schemeClr val="lt1"/>
+    </dgm:txFillClrLst>
+    <dgm:txEffectClrLst/>
+  </dgm:styleLbl>
+  <dgm:styleLbl name="fgShp">
+    <dgm:fillClrLst meth="repeat">
+      <a:schemeClr val="dk1">
         <a:tint val="60000"/>
       </a:schemeClr>
     </dgm:fillClrLst>
@@ -4516,6 +5323,871 @@
   <dgm:extLst>
     <a:ext uri="http://schemas.microsoft.com/office/drawing/2008/diagram">
       <dsp:dataModelExt xmlns:dsp="http://schemas.microsoft.com/office/drawing/2008/diagram" relId="rId6" minVer="http://schemas.openxmlformats.org/drawingml/2006/diagram"/>
+    </a:ext>
+  </dgm:extLst>
+</dgm:dataModel>
+</file>
+
+<file path=ppt/diagrams/data5.xml><?xml version="1.0" encoding="utf-8"?>
+<dgm:dataModel xmlns:dgm="http://schemas.openxmlformats.org/drawingml/2006/diagram" xmlns:a="http://schemas.openxmlformats.org/drawingml/2006/main">
+  <dgm:ptLst>
+    <dgm:pt modelId="{2346C551-8E08-4C27-8F8C-96614A3D3B50}" type="doc">
+      <dgm:prSet loTypeId="urn:microsoft.com/office/officeart/2005/8/layout/lProcess2" loCatId="list" qsTypeId="urn:microsoft.com/office/officeart/2005/8/quickstyle/simple1" qsCatId="simple" csTypeId="urn:microsoft.com/office/officeart/2005/8/colors/accent0_1" csCatId="mainScheme" phldr="1"/>
+      <dgm:spPr/>
+      <dgm:t>
+        <a:bodyPr/>
+        <a:lstStyle/>
+        <a:p>
+          <a:endParaRPr lang="en-US"/>
+        </a:p>
+      </dgm:t>
+    </dgm:pt>
+    <dgm:pt modelId="{A182D7FB-FB83-4585-8AA2-5DA5C34C5E56}">
+      <dgm:prSet phldrT="[Text]"/>
+      <dgm:spPr/>
+      <dgm:t>
+        <a:bodyPr/>
+        <a:lstStyle/>
+        <a:p>
+          <a:r>
+            <a:rPr lang="en-US" b="1" dirty="0" err="1" smtClean="0"/>
+            <a:t>Topik</a:t>
+          </a:r>
+          <a:r>
+            <a:rPr lang="en-US" b="1" dirty="0" smtClean="0"/>
+            <a:t> </a:t>
+          </a:r>
+          <a:r>
+            <a:rPr lang="en-US" b="1" dirty="0" err="1" smtClean="0"/>
+            <a:t>Ulasan</a:t>
+          </a:r>
+          <a:endParaRPr lang="en-US" b="1" dirty="0"/>
+        </a:p>
+      </dgm:t>
+    </dgm:pt>
+    <dgm:pt modelId="{7133BBC9-EBFD-4570-ACA8-DA2E430785AD}" type="parTrans" cxnId="{DC8530A9-0FEE-476B-8ED1-F34977E02635}">
+      <dgm:prSet/>
+      <dgm:spPr/>
+      <dgm:t>
+        <a:bodyPr/>
+        <a:lstStyle/>
+        <a:p>
+          <a:endParaRPr lang="en-US"/>
+        </a:p>
+      </dgm:t>
+    </dgm:pt>
+    <dgm:pt modelId="{238A18E9-D881-41F7-A616-21309DCC54BA}" type="sibTrans" cxnId="{DC8530A9-0FEE-476B-8ED1-F34977E02635}">
+      <dgm:prSet/>
+      <dgm:spPr/>
+      <dgm:t>
+        <a:bodyPr/>
+        <a:lstStyle/>
+        <a:p>
+          <a:endParaRPr lang="en-US"/>
+        </a:p>
+      </dgm:t>
+    </dgm:pt>
+    <dgm:pt modelId="{2D15FE35-C5AE-4A8E-9859-6742689A5937}">
+      <dgm:prSet phldrT="[Text]"/>
+      <dgm:spPr/>
+      <dgm:t>
+        <a:bodyPr/>
+        <a:lstStyle/>
+        <a:p>
+          <a:r>
+            <a:rPr lang="en-US" dirty="0" smtClean="0"/>
+            <a:t>Tingkat </a:t>
+          </a:r>
+          <a:r>
+            <a:rPr lang="en-US" dirty="0" err="1" smtClean="0"/>
+            <a:t>kemudahan</a:t>
+          </a:r>
+          <a:r>
+            <a:rPr lang="en-US" dirty="0" smtClean="0"/>
+            <a:t> </a:t>
+          </a:r>
+          <a:r>
+            <a:rPr lang="en-US" dirty="0" err="1" smtClean="0"/>
+            <a:t>memahami</a:t>
+          </a:r>
+          <a:r>
+            <a:rPr lang="en-US" dirty="0" smtClean="0"/>
+            <a:t> idiom</a:t>
+          </a:r>
+          <a:endParaRPr lang="en-US" dirty="0"/>
+        </a:p>
+      </dgm:t>
+    </dgm:pt>
+    <dgm:pt modelId="{CF8BB6CA-E482-433D-8489-D6FDDBCA27A7}" type="parTrans" cxnId="{A620AF89-5E7E-48FD-8C8A-730507E2B71B}">
+      <dgm:prSet/>
+      <dgm:spPr/>
+      <dgm:t>
+        <a:bodyPr/>
+        <a:lstStyle/>
+        <a:p>
+          <a:endParaRPr lang="en-US"/>
+        </a:p>
+      </dgm:t>
+    </dgm:pt>
+    <dgm:pt modelId="{FE1719A1-DD65-48FB-BAAE-1524474B1CBD}" type="sibTrans" cxnId="{A620AF89-5E7E-48FD-8C8A-730507E2B71B}">
+      <dgm:prSet/>
+      <dgm:spPr/>
+      <dgm:t>
+        <a:bodyPr/>
+        <a:lstStyle/>
+        <a:p>
+          <a:endParaRPr lang="en-US"/>
+        </a:p>
+      </dgm:t>
+    </dgm:pt>
+    <dgm:pt modelId="{95CAE1E7-4C91-42A1-924C-8CDD20345C67}">
+      <dgm:prSet phldrT="[Text]"/>
+      <dgm:spPr/>
+      <dgm:t>
+        <a:bodyPr/>
+        <a:lstStyle/>
+        <a:p>
+          <a:r>
+            <a:rPr lang="en-US" dirty="0" err="1" smtClean="0"/>
+            <a:t>Apakah</a:t>
+          </a:r>
+          <a:r>
+            <a:rPr lang="en-US" dirty="0" smtClean="0"/>
+            <a:t> idiom </a:t>
+          </a:r>
+          <a:r>
+            <a:rPr lang="en-US" dirty="0" err="1" smtClean="0"/>
+            <a:t>visualisasi</a:t>
+          </a:r>
+          <a:r>
+            <a:rPr lang="en-US" dirty="0" smtClean="0"/>
+            <a:t> </a:t>
+          </a:r>
+          <a:r>
+            <a:rPr lang="en-US" dirty="0" err="1" smtClean="0"/>
+            <a:t>sudah</a:t>
+          </a:r>
+          <a:r>
+            <a:rPr lang="en-US" dirty="0" smtClean="0"/>
+            <a:t> informative?</a:t>
+          </a:r>
+          <a:endParaRPr lang="en-US" dirty="0"/>
+        </a:p>
+      </dgm:t>
+    </dgm:pt>
+    <dgm:pt modelId="{667605DE-790F-45D6-A42A-31AF1591598E}" type="parTrans" cxnId="{D2342ABC-0A6F-4E02-B1EB-0336C50AF714}">
+      <dgm:prSet/>
+      <dgm:spPr/>
+      <dgm:t>
+        <a:bodyPr/>
+        <a:lstStyle/>
+        <a:p>
+          <a:endParaRPr lang="en-US"/>
+        </a:p>
+      </dgm:t>
+    </dgm:pt>
+    <dgm:pt modelId="{BD08E912-43AE-410F-8323-514FBCE37C9C}" type="sibTrans" cxnId="{D2342ABC-0A6F-4E02-B1EB-0336C50AF714}">
+      <dgm:prSet/>
+      <dgm:spPr/>
+      <dgm:t>
+        <a:bodyPr/>
+        <a:lstStyle/>
+        <a:p>
+          <a:endParaRPr lang="en-US"/>
+        </a:p>
+      </dgm:t>
+    </dgm:pt>
+    <dgm:pt modelId="{A826D8EC-B093-4DB2-9B6A-B7990A7C6664}">
+      <dgm:prSet phldrT="[Text]"/>
+      <dgm:spPr/>
+      <dgm:t>
+        <a:bodyPr/>
+        <a:lstStyle/>
+        <a:p>
+          <a:r>
+            <a:rPr lang="en-US" b="1" dirty="0" err="1" smtClean="0"/>
+            <a:t>Analisis</a:t>
+          </a:r>
+          <a:endParaRPr lang="en-US" b="1" dirty="0"/>
+        </a:p>
+      </dgm:t>
+    </dgm:pt>
+    <dgm:pt modelId="{CE22EB24-AA0C-4620-A9CB-BBD123FDDB48}" type="parTrans" cxnId="{4DE6B6FB-51BF-4535-B7F8-A7AAB868C277}">
+      <dgm:prSet/>
+      <dgm:spPr/>
+      <dgm:t>
+        <a:bodyPr/>
+        <a:lstStyle/>
+        <a:p>
+          <a:endParaRPr lang="en-US"/>
+        </a:p>
+      </dgm:t>
+    </dgm:pt>
+    <dgm:pt modelId="{D3985923-0468-4DDA-8458-0E6414D05E18}" type="sibTrans" cxnId="{4DE6B6FB-51BF-4535-B7F8-A7AAB868C277}">
+      <dgm:prSet/>
+      <dgm:spPr/>
+      <dgm:t>
+        <a:bodyPr/>
+        <a:lstStyle/>
+        <a:p>
+          <a:endParaRPr lang="en-US"/>
+        </a:p>
+      </dgm:t>
+    </dgm:pt>
+    <dgm:pt modelId="{331F61E3-2A7D-4BBA-8A40-B03511887EDD}">
+      <dgm:prSet phldrT="[Text]"/>
+      <dgm:spPr/>
+      <dgm:t>
+        <a:bodyPr/>
+        <a:lstStyle/>
+        <a:p>
+          <a:r>
+            <a:rPr lang="en-US" dirty="0" smtClean="0"/>
+            <a:t>80% </a:t>
+          </a:r>
+          <a:r>
+            <a:rPr lang="en-US" dirty="0" err="1" smtClean="0"/>
+            <a:t>responden</a:t>
+          </a:r>
+          <a:r>
+            <a:rPr lang="en-US" dirty="0" smtClean="0"/>
+            <a:t> </a:t>
+          </a:r>
+          <a:r>
+            <a:rPr lang="en-US" dirty="0" err="1" smtClean="0"/>
+            <a:t>memahami</a:t>
+          </a:r>
+          <a:r>
+            <a:rPr lang="en-US" dirty="0" smtClean="0"/>
+            <a:t> idiom </a:t>
+          </a:r>
+          <a:r>
+            <a:rPr lang="en-US" dirty="0" err="1" smtClean="0"/>
+            <a:t>dengan</a:t>
+          </a:r>
+          <a:r>
+            <a:rPr lang="en-US" dirty="0" smtClean="0"/>
+            <a:t> </a:t>
+          </a:r>
+          <a:r>
+            <a:rPr lang="en-US" dirty="0" err="1" smtClean="0"/>
+            <a:t>baik</a:t>
+          </a:r>
+          <a:endParaRPr lang="en-US" dirty="0"/>
+        </a:p>
+      </dgm:t>
+    </dgm:pt>
+    <dgm:pt modelId="{4E53E48B-49F4-4E53-B34D-F6AF7A9D2A4A}" type="parTrans" cxnId="{CBC35384-752C-4046-B633-27B7E2EBCA9A}">
+      <dgm:prSet/>
+      <dgm:spPr/>
+      <dgm:t>
+        <a:bodyPr/>
+        <a:lstStyle/>
+        <a:p>
+          <a:endParaRPr lang="en-US"/>
+        </a:p>
+      </dgm:t>
+    </dgm:pt>
+    <dgm:pt modelId="{F262FEF7-24A4-4B28-B0B4-F9787B95B676}" type="sibTrans" cxnId="{CBC35384-752C-4046-B633-27B7E2EBCA9A}">
+      <dgm:prSet/>
+      <dgm:spPr/>
+      <dgm:t>
+        <a:bodyPr/>
+        <a:lstStyle/>
+        <a:p>
+          <a:endParaRPr lang="en-US"/>
+        </a:p>
+      </dgm:t>
+    </dgm:pt>
+    <dgm:pt modelId="{9A3906C5-9D0B-4F55-9435-1628C6ABAD6C}">
+      <dgm:prSet phldrT="[Text]"/>
+      <dgm:spPr/>
+      <dgm:t>
+        <a:bodyPr/>
+        <a:lstStyle/>
+        <a:p>
+          <a:r>
+            <a:rPr lang="en-US" dirty="0" smtClean="0"/>
+            <a:t>20% </a:t>
+          </a:r>
+          <a:r>
+            <a:rPr lang="en-US" dirty="0" err="1" smtClean="0"/>
+            <a:t>responden</a:t>
+          </a:r>
+          <a:r>
+            <a:rPr lang="en-US" dirty="0" smtClean="0"/>
+            <a:t> </a:t>
+          </a:r>
+          <a:r>
+            <a:rPr lang="en-US" dirty="0" err="1" smtClean="0"/>
+            <a:t>membutuhkan</a:t>
+          </a:r>
+          <a:r>
+            <a:rPr lang="en-US" dirty="0" smtClean="0"/>
+            <a:t> </a:t>
+          </a:r>
+          <a:r>
+            <a:rPr lang="en-US" dirty="0" err="1" smtClean="0"/>
+            <a:t>lebih</a:t>
+          </a:r>
+          <a:r>
+            <a:rPr lang="en-US" dirty="0" smtClean="0"/>
+            <a:t> </a:t>
+          </a:r>
+          <a:r>
+            <a:rPr lang="en-US" dirty="0" err="1" smtClean="0"/>
+            <a:t>banyak</a:t>
+          </a:r>
+          <a:r>
+            <a:rPr lang="en-US" dirty="0" smtClean="0"/>
+            <a:t> </a:t>
+          </a:r>
+          <a:r>
+            <a:rPr lang="en-US" dirty="0" err="1" smtClean="0"/>
+            <a:t>wwaktu</a:t>
+          </a:r>
+          <a:r>
+            <a:rPr lang="en-US" dirty="0" smtClean="0"/>
+            <a:t> </a:t>
+          </a:r>
+          <a:r>
+            <a:rPr lang="en-US" dirty="0" err="1" smtClean="0"/>
+            <a:t>untuk</a:t>
+          </a:r>
+          <a:r>
+            <a:rPr lang="en-US" dirty="0" smtClean="0"/>
+            <a:t> </a:t>
+          </a:r>
+          <a:r>
+            <a:rPr lang="en-US" dirty="0" err="1" smtClean="0"/>
+            <a:t>memahami</a:t>
+          </a:r>
+          <a:endParaRPr lang="en-US" dirty="0"/>
+        </a:p>
+      </dgm:t>
+    </dgm:pt>
+    <dgm:pt modelId="{B05D3F06-0CC2-4C32-8A7F-651D653D2341}" type="parTrans" cxnId="{0B2080D9-008C-4695-9316-18EA559AF7BB}">
+      <dgm:prSet/>
+      <dgm:spPr/>
+      <dgm:t>
+        <a:bodyPr/>
+        <a:lstStyle/>
+        <a:p>
+          <a:endParaRPr lang="en-US"/>
+        </a:p>
+      </dgm:t>
+    </dgm:pt>
+    <dgm:pt modelId="{C1BBCE6C-94D0-4EED-968C-E73708FC9442}" type="sibTrans" cxnId="{0B2080D9-008C-4695-9316-18EA559AF7BB}">
+      <dgm:prSet/>
+      <dgm:spPr/>
+      <dgm:t>
+        <a:bodyPr/>
+        <a:lstStyle/>
+        <a:p>
+          <a:endParaRPr lang="en-US"/>
+        </a:p>
+      </dgm:t>
+    </dgm:pt>
+    <dgm:pt modelId="{1A829594-E1B6-45CC-936F-124D40B0EA0B}">
+      <dgm:prSet phldrT="[Text]"/>
+      <dgm:spPr/>
+      <dgm:t>
+        <a:bodyPr/>
+        <a:lstStyle/>
+        <a:p>
+          <a:r>
+            <a:rPr lang="en-US" b="1" dirty="0" err="1" smtClean="0"/>
+            <a:t>Kesimpulan</a:t>
+          </a:r>
+          <a:endParaRPr lang="en-US" b="1" dirty="0"/>
+        </a:p>
+      </dgm:t>
+    </dgm:pt>
+    <dgm:pt modelId="{D5E66D86-DC86-4CCF-98C6-37FBB72AD288}" type="parTrans" cxnId="{D54ED28D-D45B-4C44-B112-BF7DCC4F9F08}">
+      <dgm:prSet/>
+      <dgm:spPr/>
+      <dgm:t>
+        <a:bodyPr/>
+        <a:lstStyle/>
+        <a:p>
+          <a:endParaRPr lang="en-US"/>
+        </a:p>
+      </dgm:t>
+    </dgm:pt>
+    <dgm:pt modelId="{EA2CC4B4-F6EF-4466-8EFA-638C548084B1}" type="sibTrans" cxnId="{D54ED28D-D45B-4C44-B112-BF7DCC4F9F08}">
+      <dgm:prSet/>
+      <dgm:spPr/>
+      <dgm:t>
+        <a:bodyPr/>
+        <a:lstStyle/>
+        <a:p>
+          <a:endParaRPr lang="en-US"/>
+        </a:p>
+      </dgm:t>
+    </dgm:pt>
+    <dgm:pt modelId="{79001B65-7EF1-423D-BF99-4ABFD08672C4}">
+      <dgm:prSet phldrT="[Text]"/>
+      <dgm:spPr/>
+      <dgm:t>
+        <a:bodyPr/>
+        <a:lstStyle/>
+        <a:p>
+          <a:r>
+            <a:rPr lang="en-US" dirty="0" err="1" smtClean="0"/>
+            <a:t>Ketiga</a:t>
+          </a:r>
+          <a:r>
+            <a:rPr lang="en-US" dirty="0" smtClean="0"/>
+            <a:t> idiom </a:t>
+          </a:r>
+          <a:r>
+            <a:rPr lang="en-US" dirty="0" err="1" smtClean="0"/>
+            <a:t>visualisasi</a:t>
+          </a:r>
+          <a:r>
+            <a:rPr lang="en-US" dirty="0" smtClean="0"/>
+            <a:t> yang </a:t>
+          </a:r>
+          <a:r>
+            <a:rPr lang="en-US" dirty="0" err="1" smtClean="0"/>
+            <a:t>dihasilkan</a:t>
+          </a:r>
+          <a:r>
+            <a:rPr lang="en-US" dirty="0" smtClean="0"/>
+            <a:t> </a:t>
+          </a:r>
+          <a:r>
+            <a:rPr lang="en-US" dirty="0" err="1" smtClean="0"/>
+            <a:t>dimengerti</a:t>
+          </a:r>
+          <a:r>
+            <a:rPr lang="en-US" dirty="0" smtClean="0"/>
+            <a:t> </a:t>
+          </a:r>
+          <a:r>
+            <a:rPr lang="en-US" dirty="0" err="1" smtClean="0"/>
+            <a:t>oleh</a:t>
+          </a:r>
+          <a:r>
+            <a:rPr lang="en-US" dirty="0" smtClean="0"/>
+            <a:t> </a:t>
+          </a:r>
+          <a:r>
+            <a:rPr lang="en-US" dirty="0" err="1" smtClean="0"/>
+            <a:t>sebagian</a:t>
+          </a:r>
+          <a:r>
+            <a:rPr lang="en-US" dirty="0" smtClean="0"/>
+            <a:t> </a:t>
+          </a:r>
+          <a:r>
+            <a:rPr lang="en-US" dirty="0" err="1" smtClean="0"/>
+            <a:t>besar</a:t>
+          </a:r>
+          <a:r>
+            <a:rPr lang="en-US" dirty="0" smtClean="0"/>
+            <a:t> orang.</a:t>
+          </a:r>
+          <a:endParaRPr lang="en-US" dirty="0"/>
+        </a:p>
+      </dgm:t>
+    </dgm:pt>
+    <dgm:pt modelId="{1F82DE8D-5738-46C5-AFAB-D41AB5683361}" type="parTrans" cxnId="{648389E8-9239-426D-8A1C-CA55564664A2}">
+      <dgm:prSet/>
+      <dgm:spPr/>
+      <dgm:t>
+        <a:bodyPr/>
+        <a:lstStyle/>
+        <a:p>
+          <a:endParaRPr lang="en-US"/>
+        </a:p>
+      </dgm:t>
+    </dgm:pt>
+    <dgm:pt modelId="{7CCEDF30-9CF6-4688-9CE0-614F8CC6CB5C}" type="sibTrans" cxnId="{648389E8-9239-426D-8A1C-CA55564664A2}">
+      <dgm:prSet/>
+      <dgm:spPr/>
+      <dgm:t>
+        <a:bodyPr/>
+        <a:lstStyle/>
+        <a:p>
+          <a:endParaRPr lang="en-US"/>
+        </a:p>
+      </dgm:t>
+    </dgm:pt>
+    <dgm:pt modelId="{C030467D-4354-4589-9A6B-C840E998D4A3}">
+      <dgm:prSet phldrT="[Text]"/>
+      <dgm:spPr/>
+      <dgm:t>
+        <a:bodyPr/>
+        <a:lstStyle/>
+        <a:p>
+          <a:r>
+            <a:rPr lang="en-US" dirty="0" err="1" smtClean="0"/>
+            <a:t>Namun</a:t>
+          </a:r>
+          <a:r>
+            <a:rPr lang="en-US" dirty="0" smtClean="0"/>
+            <a:t>, </a:t>
+          </a:r>
+          <a:r>
+            <a:rPr lang="en-US" dirty="0" err="1" smtClean="0"/>
+            <a:t>sebagian</a:t>
+          </a:r>
+          <a:r>
+            <a:rPr lang="en-US" dirty="0" smtClean="0"/>
+            <a:t> </a:t>
+          </a:r>
+          <a:r>
+            <a:rPr lang="en-US" dirty="0" err="1" smtClean="0"/>
+            <a:t>kecil</a:t>
+          </a:r>
+          <a:r>
+            <a:rPr lang="en-US" dirty="0" smtClean="0"/>
+            <a:t> </a:t>
+          </a:r>
+          <a:r>
+            <a:rPr lang="en-US" dirty="0" err="1" smtClean="0"/>
+            <a:t>mengalami</a:t>
+          </a:r>
+          <a:r>
+            <a:rPr lang="en-US" dirty="0" smtClean="0"/>
+            <a:t> </a:t>
+          </a:r>
+          <a:r>
+            <a:rPr lang="en-US" dirty="0" err="1" smtClean="0"/>
+            <a:t>sedikit</a:t>
+          </a:r>
+          <a:r>
+            <a:rPr lang="en-US" dirty="0" smtClean="0"/>
+            <a:t> </a:t>
+          </a:r>
+          <a:r>
+            <a:rPr lang="en-US" dirty="0" err="1" smtClean="0"/>
+            <a:t>kesulitan</a:t>
+          </a:r>
+          <a:r>
+            <a:rPr lang="en-US" dirty="0" smtClean="0"/>
+            <a:t>. </a:t>
+          </a:r>
+          <a:r>
+            <a:rPr lang="en-US" dirty="0" err="1" smtClean="0"/>
+            <a:t>Sehingga</a:t>
+          </a:r>
+          <a:r>
+            <a:rPr lang="en-US" dirty="0" smtClean="0"/>
+            <a:t> </a:t>
+          </a:r>
+          <a:r>
+            <a:rPr lang="en-US" dirty="0" err="1" smtClean="0"/>
+            <a:t>perlu</a:t>
+          </a:r>
+          <a:r>
+            <a:rPr lang="en-US" dirty="0" smtClean="0"/>
+            <a:t> </a:t>
+          </a:r>
+          <a:r>
+            <a:rPr lang="en-US" dirty="0" err="1" smtClean="0"/>
+            <a:t>dilakukan</a:t>
+          </a:r>
+          <a:r>
+            <a:rPr lang="en-US" dirty="0" smtClean="0"/>
+            <a:t> </a:t>
+          </a:r>
+          <a:r>
+            <a:rPr lang="en-US" dirty="0" err="1" smtClean="0"/>
+            <a:t>sedikit</a:t>
+          </a:r>
+          <a:r>
+            <a:rPr lang="en-US" dirty="0" smtClean="0"/>
+            <a:t> </a:t>
+          </a:r>
+          <a:r>
+            <a:rPr lang="en-US" dirty="0" err="1" smtClean="0"/>
+            <a:t>perbaikan</a:t>
+          </a:r>
+          <a:r>
+            <a:rPr lang="en-US" dirty="0" smtClean="0"/>
+            <a:t>.</a:t>
+          </a:r>
+          <a:endParaRPr lang="en-US" dirty="0"/>
+        </a:p>
+      </dgm:t>
+    </dgm:pt>
+    <dgm:pt modelId="{36C19BE7-C17B-4848-9941-476F1C657E0F}" type="parTrans" cxnId="{230BD506-70DA-4CDF-8E3E-5EE3DBD348EE}">
+      <dgm:prSet/>
+      <dgm:spPr/>
+      <dgm:t>
+        <a:bodyPr/>
+        <a:lstStyle/>
+        <a:p>
+          <a:endParaRPr lang="en-US"/>
+        </a:p>
+      </dgm:t>
+    </dgm:pt>
+    <dgm:pt modelId="{AA51BADB-6875-4BED-B2DC-36546D0D8628}" type="sibTrans" cxnId="{230BD506-70DA-4CDF-8E3E-5EE3DBD348EE}">
+      <dgm:prSet/>
+      <dgm:spPr/>
+      <dgm:t>
+        <a:bodyPr/>
+        <a:lstStyle/>
+        <a:p>
+          <a:endParaRPr lang="en-US"/>
+        </a:p>
+      </dgm:t>
+    </dgm:pt>
+    <dgm:pt modelId="{1B46F6F2-8DDB-42DA-A981-D30CCC64C73A}" type="pres">
+      <dgm:prSet presAssocID="{2346C551-8E08-4C27-8F8C-96614A3D3B50}" presName="theList" presStyleCnt="0">
+        <dgm:presLayoutVars>
+          <dgm:dir/>
+          <dgm:animLvl val="lvl"/>
+          <dgm:resizeHandles val="exact"/>
+        </dgm:presLayoutVars>
+      </dgm:prSet>
+      <dgm:spPr/>
+    </dgm:pt>
+    <dgm:pt modelId="{902ACE76-9D27-4ED9-B622-2F97AF840C6C}" type="pres">
+      <dgm:prSet presAssocID="{A182D7FB-FB83-4585-8AA2-5DA5C34C5E56}" presName="compNode" presStyleCnt="0"/>
+      <dgm:spPr/>
+    </dgm:pt>
+    <dgm:pt modelId="{E57A7402-6F5D-4234-8FCC-9D76FCCB4969}" type="pres">
+      <dgm:prSet presAssocID="{A182D7FB-FB83-4585-8AA2-5DA5C34C5E56}" presName="aNode" presStyleLbl="bgShp" presStyleIdx="0" presStyleCnt="3"/>
+      <dgm:spPr/>
+      <dgm:t>
+        <a:bodyPr/>
+        <a:lstStyle/>
+        <a:p>
+          <a:endParaRPr lang="en-US"/>
+        </a:p>
+      </dgm:t>
+    </dgm:pt>
+    <dgm:pt modelId="{E308E1CE-5436-4340-AA56-DC9A62DB1D1C}" type="pres">
+      <dgm:prSet presAssocID="{A182D7FB-FB83-4585-8AA2-5DA5C34C5E56}" presName="textNode" presStyleLbl="bgShp" presStyleIdx="0" presStyleCnt="3"/>
+      <dgm:spPr/>
+      <dgm:t>
+        <a:bodyPr/>
+        <a:lstStyle/>
+        <a:p>
+          <a:endParaRPr lang="en-US"/>
+        </a:p>
+      </dgm:t>
+    </dgm:pt>
+    <dgm:pt modelId="{4BE4B0E8-84EC-413B-8C0C-C1F7EA2D41EA}" type="pres">
+      <dgm:prSet presAssocID="{A182D7FB-FB83-4585-8AA2-5DA5C34C5E56}" presName="compChildNode" presStyleCnt="0"/>
+      <dgm:spPr/>
+    </dgm:pt>
+    <dgm:pt modelId="{C3C06365-C37F-47D2-ABEC-A39ED027A9B8}" type="pres">
+      <dgm:prSet presAssocID="{A182D7FB-FB83-4585-8AA2-5DA5C34C5E56}" presName="theInnerList" presStyleCnt="0"/>
+      <dgm:spPr/>
+    </dgm:pt>
+    <dgm:pt modelId="{3568F4EA-A521-4001-9720-2EE8C8BB2055}" type="pres">
+      <dgm:prSet presAssocID="{2D15FE35-C5AE-4A8E-9859-6742689A5937}" presName="childNode" presStyleLbl="node1" presStyleIdx="0" presStyleCnt="6">
+        <dgm:presLayoutVars>
+          <dgm:bulletEnabled val="1"/>
+        </dgm:presLayoutVars>
+      </dgm:prSet>
+      <dgm:spPr/>
+      <dgm:t>
+        <a:bodyPr/>
+        <a:lstStyle/>
+        <a:p>
+          <a:endParaRPr lang="en-US"/>
+        </a:p>
+      </dgm:t>
+    </dgm:pt>
+    <dgm:pt modelId="{CDC13DEA-CEE5-4089-B972-012665E74260}" type="pres">
+      <dgm:prSet presAssocID="{2D15FE35-C5AE-4A8E-9859-6742689A5937}" presName="aSpace2" presStyleCnt="0"/>
+      <dgm:spPr/>
+    </dgm:pt>
+    <dgm:pt modelId="{C07E69CC-54FD-4FA7-9E0E-3A1E8B355DC8}" type="pres">
+      <dgm:prSet presAssocID="{95CAE1E7-4C91-42A1-924C-8CDD20345C67}" presName="childNode" presStyleLbl="node1" presStyleIdx="1" presStyleCnt="6">
+        <dgm:presLayoutVars>
+          <dgm:bulletEnabled val="1"/>
+        </dgm:presLayoutVars>
+      </dgm:prSet>
+      <dgm:spPr/>
+      <dgm:t>
+        <a:bodyPr/>
+        <a:lstStyle/>
+        <a:p>
+          <a:endParaRPr lang="en-US"/>
+        </a:p>
+      </dgm:t>
+    </dgm:pt>
+    <dgm:pt modelId="{834A2E11-A0D9-4BA3-B5BA-3684DF59F1C5}" type="pres">
+      <dgm:prSet presAssocID="{A182D7FB-FB83-4585-8AA2-5DA5C34C5E56}" presName="aSpace" presStyleCnt="0"/>
+      <dgm:spPr/>
+    </dgm:pt>
+    <dgm:pt modelId="{D5DEAED9-D57C-49F8-AD76-FC104058F4FD}" type="pres">
+      <dgm:prSet presAssocID="{A826D8EC-B093-4DB2-9B6A-B7990A7C6664}" presName="compNode" presStyleCnt="0"/>
+      <dgm:spPr/>
+    </dgm:pt>
+    <dgm:pt modelId="{26A4E411-939B-4651-A61A-05B1242849D3}" type="pres">
+      <dgm:prSet presAssocID="{A826D8EC-B093-4DB2-9B6A-B7990A7C6664}" presName="aNode" presStyleLbl="bgShp" presStyleIdx="1" presStyleCnt="3"/>
+      <dgm:spPr/>
+    </dgm:pt>
+    <dgm:pt modelId="{A1C9C73C-9DBA-442F-8EA7-B7BDFE2156A9}" type="pres">
+      <dgm:prSet presAssocID="{A826D8EC-B093-4DB2-9B6A-B7990A7C6664}" presName="textNode" presStyleLbl="bgShp" presStyleIdx="1" presStyleCnt="3"/>
+      <dgm:spPr/>
+    </dgm:pt>
+    <dgm:pt modelId="{4FCFCC68-569F-4DE3-A7E4-4E4512201E75}" type="pres">
+      <dgm:prSet presAssocID="{A826D8EC-B093-4DB2-9B6A-B7990A7C6664}" presName="compChildNode" presStyleCnt="0"/>
+      <dgm:spPr/>
+    </dgm:pt>
+    <dgm:pt modelId="{DB7246AB-A46F-46B0-93DF-B901DCCED8BF}" type="pres">
+      <dgm:prSet presAssocID="{A826D8EC-B093-4DB2-9B6A-B7990A7C6664}" presName="theInnerList" presStyleCnt="0"/>
+      <dgm:spPr/>
+    </dgm:pt>
+    <dgm:pt modelId="{0960F51A-BB83-4055-9723-6C99E0C53508}" type="pres">
+      <dgm:prSet presAssocID="{331F61E3-2A7D-4BBA-8A40-B03511887EDD}" presName="childNode" presStyleLbl="node1" presStyleIdx="2" presStyleCnt="6">
+        <dgm:presLayoutVars>
+          <dgm:bulletEnabled val="1"/>
+        </dgm:presLayoutVars>
+      </dgm:prSet>
+      <dgm:spPr/>
+      <dgm:t>
+        <a:bodyPr/>
+        <a:lstStyle/>
+        <a:p>
+          <a:endParaRPr lang="en-US"/>
+        </a:p>
+      </dgm:t>
+    </dgm:pt>
+    <dgm:pt modelId="{69719A7F-37D4-4619-822E-25ED5AEF7F2C}" type="pres">
+      <dgm:prSet presAssocID="{331F61E3-2A7D-4BBA-8A40-B03511887EDD}" presName="aSpace2" presStyleCnt="0"/>
+      <dgm:spPr/>
+    </dgm:pt>
+    <dgm:pt modelId="{22EAFAC4-54E9-4394-93D3-79BCC8A5BD0A}" type="pres">
+      <dgm:prSet presAssocID="{9A3906C5-9D0B-4F55-9435-1628C6ABAD6C}" presName="childNode" presStyleLbl="node1" presStyleIdx="3" presStyleCnt="6">
+        <dgm:presLayoutVars>
+          <dgm:bulletEnabled val="1"/>
+        </dgm:presLayoutVars>
+      </dgm:prSet>
+      <dgm:spPr/>
+      <dgm:t>
+        <a:bodyPr/>
+        <a:lstStyle/>
+        <a:p>
+          <a:endParaRPr lang="en-US"/>
+        </a:p>
+      </dgm:t>
+    </dgm:pt>
+    <dgm:pt modelId="{CF3F2D1E-0B26-4B9E-87A2-DBEF5A4F1E2C}" type="pres">
+      <dgm:prSet presAssocID="{A826D8EC-B093-4DB2-9B6A-B7990A7C6664}" presName="aSpace" presStyleCnt="0"/>
+      <dgm:spPr/>
+    </dgm:pt>
+    <dgm:pt modelId="{43F4C97F-1AD4-46C3-88A4-29CDED25DA78}" type="pres">
+      <dgm:prSet presAssocID="{1A829594-E1B6-45CC-936F-124D40B0EA0B}" presName="compNode" presStyleCnt="0"/>
+      <dgm:spPr/>
+    </dgm:pt>
+    <dgm:pt modelId="{717087EA-DC7D-4B16-A04A-7BEF4CD60C0B}" type="pres">
+      <dgm:prSet presAssocID="{1A829594-E1B6-45CC-936F-124D40B0EA0B}" presName="aNode" presStyleLbl="bgShp" presStyleIdx="2" presStyleCnt="3"/>
+      <dgm:spPr/>
+    </dgm:pt>
+    <dgm:pt modelId="{D9DBE475-8785-40C0-8EE3-678A07DCE16E}" type="pres">
+      <dgm:prSet presAssocID="{1A829594-E1B6-45CC-936F-124D40B0EA0B}" presName="textNode" presStyleLbl="bgShp" presStyleIdx="2" presStyleCnt="3"/>
+      <dgm:spPr/>
+    </dgm:pt>
+    <dgm:pt modelId="{4E12633A-6662-40AE-96B1-18ABED36C7A9}" type="pres">
+      <dgm:prSet presAssocID="{1A829594-E1B6-45CC-936F-124D40B0EA0B}" presName="compChildNode" presStyleCnt="0"/>
+      <dgm:spPr/>
+    </dgm:pt>
+    <dgm:pt modelId="{A97BCC15-33B0-4A0A-80A1-5F61DC082FA4}" type="pres">
+      <dgm:prSet presAssocID="{1A829594-E1B6-45CC-936F-124D40B0EA0B}" presName="theInnerList" presStyleCnt="0"/>
+      <dgm:spPr/>
+    </dgm:pt>
+    <dgm:pt modelId="{9E7C08B4-5D4A-4881-B948-B7EE88DD96B0}" type="pres">
+      <dgm:prSet presAssocID="{79001B65-7EF1-423D-BF99-4ABFD08672C4}" presName="childNode" presStyleLbl="node1" presStyleIdx="4" presStyleCnt="6">
+        <dgm:presLayoutVars>
+          <dgm:bulletEnabled val="1"/>
+        </dgm:presLayoutVars>
+      </dgm:prSet>
+      <dgm:spPr/>
+      <dgm:t>
+        <a:bodyPr/>
+        <a:lstStyle/>
+        <a:p>
+          <a:endParaRPr lang="en-US"/>
+        </a:p>
+      </dgm:t>
+    </dgm:pt>
+    <dgm:pt modelId="{EFB85AD6-BF7B-411C-BF45-F314E58096A5}" type="pres">
+      <dgm:prSet presAssocID="{79001B65-7EF1-423D-BF99-4ABFD08672C4}" presName="aSpace2" presStyleCnt="0"/>
+      <dgm:spPr/>
+    </dgm:pt>
+    <dgm:pt modelId="{B9A821AA-5CE7-4802-8DFA-7B35B175EDAD}" type="pres">
+      <dgm:prSet presAssocID="{C030467D-4354-4589-9A6B-C840E998D4A3}" presName="childNode" presStyleLbl="node1" presStyleIdx="5" presStyleCnt="6">
+        <dgm:presLayoutVars>
+          <dgm:bulletEnabled val="1"/>
+        </dgm:presLayoutVars>
+      </dgm:prSet>
+      <dgm:spPr/>
+      <dgm:t>
+        <a:bodyPr/>
+        <a:lstStyle/>
+        <a:p>
+          <a:endParaRPr lang="en-US"/>
+        </a:p>
+      </dgm:t>
+    </dgm:pt>
+  </dgm:ptLst>
+  <dgm:cxnLst>
+    <dgm:cxn modelId="{0B2080D9-008C-4695-9316-18EA559AF7BB}" srcId="{A826D8EC-B093-4DB2-9B6A-B7990A7C6664}" destId="{9A3906C5-9D0B-4F55-9435-1628C6ABAD6C}" srcOrd="1" destOrd="0" parTransId="{B05D3F06-0CC2-4C32-8A7F-651D653D2341}" sibTransId="{C1BBCE6C-94D0-4EED-968C-E73708FC9442}"/>
+    <dgm:cxn modelId="{39B117A9-5858-4CE1-81A7-0A281A8E309D}" type="presOf" srcId="{2D15FE35-C5AE-4A8E-9859-6742689A5937}" destId="{3568F4EA-A521-4001-9720-2EE8C8BB2055}" srcOrd="0" destOrd="0" presId="urn:microsoft.com/office/officeart/2005/8/layout/lProcess2"/>
+    <dgm:cxn modelId="{EBAB3EEC-D87A-4BE0-AE89-5128CAC13E6D}" type="presOf" srcId="{95CAE1E7-4C91-42A1-924C-8CDD20345C67}" destId="{C07E69CC-54FD-4FA7-9E0E-3A1E8B355DC8}" srcOrd="0" destOrd="0" presId="urn:microsoft.com/office/officeart/2005/8/layout/lProcess2"/>
+    <dgm:cxn modelId="{E471B18E-19AE-4D04-BEAB-43409A1123CD}" type="presOf" srcId="{A826D8EC-B093-4DB2-9B6A-B7990A7C6664}" destId="{26A4E411-939B-4651-A61A-05B1242849D3}" srcOrd="0" destOrd="0" presId="urn:microsoft.com/office/officeart/2005/8/layout/lProcess2"/>
+    <dgm:cxn modelId="{648389E8-9239-426D-8A1C-CA55564664A2}" srcId="{1A829594-E1B6-45CC-936F-124D40B0EA0B}" destId="{79001B65-7EF1-423D-BF99-4ABFD08672C4}" srcOrd="0" destOrd="0" parTransId="{1F82DE8D-5738-46C5-AFAB-D41AB5683361}" sibTransId="{7CCEDF30-9CF6-4688-9CE0-614F8CC6CB5C}"/>
+    <dgm:cxn modelId="{D2342ABC-0A6F-4E02-B1EB-0336C50AF714}" srcId="{A182D7FB-FB83-4585-8AA2-5DA5C34C5E56}" destId="{95CAE1E7-4C91-42A1-924C-8CDD20345C67}" srcOrd="1" destOrd="0" parTransId="{667605DE-790F-45D6-A42A-31AF1591598E}" sibTransId="{BD08E912-43AE-410F-8323-514FBCE37C9C}"/>
+    <dgm:cxn modelId="{11972371-F654-4CD4-829F-C1E44B5512A5}" type="presOf" srcId="{C030467D-4354-4589-9A6B-C840E998D4A3}" destId="{B9A821AA-5CE7-4802-8DFA-7B35B175EDAD}" srcOrd="0" destOrd="0" presId="urn:microsoft.com/office/officeart/2005/8/layout/lProcess2"/>
+    <dgm:cxn modelId="{B8477124-EE27-4624-A076-79F07FF1855B}" type="presOf" srcId="{331F61E3-2A7D-4BBA-8A40-B03511887EDD}" destId="{0960F51A-BB83-4055-9723-6C99E0C53508}" srcOrd="0" destOrd="0" presId="urn:microsoft.com/office/officeart/2005/8/layout/lProcess2"/>
+    <dgm:cxn modelId="{73AE5610-F531-47E5-8E1A-09BB47AE1D00}" type="presOf" srcId="{A182D7FB-FB83-4585-8AA2-5DA5C34C5E56}" destId="{E57A7402-6F5D-4234-8FCC-9D76FCCB4969}" srcOrd="0" destOrd="0" presId="urn:microsoft.com/office/officeart/2005/8/layout/lProcess2"/>
+    <dgm:cxn modelId="{C8C41F93-DAAE-489D-AAD0-2B028C6BA5E6}" type="presOf" srcId="{9A3906C5-9D0B-4F55-9435-1628C6ABAD6C}" destId="{22EAFAC4-54E9-4394-93D3-79BCC8A5BD0A}" srcOrd="0" destOrd="0" presId="urn:microsoft.com/office/officeart/2005/8/layout/lProcess2"/>
+    <dgm:cxn modelId="{DDAF693F-8647-4014-8890-923129C6E94B}" type="presOf" srcId="{2346C551-8E08-4C27-8F8C-96614A3D3B50}" destId="{1B46F6F2-8DDB-42DA-A981-D30CCC64C73A}" srcOrd="0" destOrd="0" presId="urn:microsoft.com/office/officeart/2005/8/layout/lProcess2"/>
+    <dgm:cxn modelId="{D54ED28D-D45B-4C44-B112-BF7DCC4F9F08}" srcId="{2346C551-8E08-4C27-8F8C-96614A3D3B50}" destId="{1A829594-E1B6-45CC-936F-124D40B0EA0B}" srcOrd="2" destOrd="0" parTransId="{D5E66D86-DC86-4CCF-98C6-37FBB72AD288}" sibTransId="{EA2CC4B4-F6EF-4466-8EFA-638C548084B1}"/>
+    <dgm:cxn modelId="{F4147F21-C35E-49CA-AA79-BE1D96020A5B}" type="presOf" srcId="{79001B65-7EF1-423D-BF99-4ABFD08672C4}" destId="{9E7C08B4-5D4A-4881-B948-B7EE88DD96B0}" srcOrd="0" destOrd="0" presId="urn:microsoft.com/office/officeart/2005/8/layout/lProcess2"/>
+    <dgm:cxn modelId="{A620AF89-5E7E-48FD-8C8A-730507E2B71B}" srcId="{A182D7FB-FB83-4585-8AA2-5DA5C34C5E56}" destId="{2D15FE35-C5AE-4A8E-9859-6742689A5937}" srcOrd="0" destOrd="0" parTransId="{CF8BB6CA-E482-433D-8489-D6FDDBCA27A7}" sibTransId="{FE1719A1-DD65-48FB-BAAE-1524474B1CBD}"/>
+    <dgm:cxn modelId="{4DE6B6FB-51BF-4535-B7F8-A7AAB868C277}" srcId="{2346C551-8E08-4C27-8F8C-96614A3D3B50}" destId="{A826D8EC-B093-4DB2-9B6A-B7990A7C6664}" srcOrd="1" destOrd="0" parTransId="{CE22EB24-AA0C-4620-A9CB-BBD123FDDB48}" sibTransId="{D3985923-0468-4DDA-8458-0E6414D05E18}"/>
+    <dgm:cxn modelId="{230BD506-70DA-4CDF-8E3E-5EE3DBD348EE}" srcId="{1A829594-E1B6-45CC-936F-124D40B0EA0B}" destId="{C030467D-4354-4589-9A6B-C840E998D4A3}" srcOrd="1" destOrd="0" parTransId="{36C19BE7-C17B-4848-9941-476F1C657E0F}" sibTransId="{AA51BADB-6875-4BED-B2DC-36546D0D8628}"/>
+    <dgm:cxn modelId="{DC8530A9-0FEE-476B-8ED1-F34977E02635}" srcId="{2346C551-8E08-4C27-8F8C-96614A3D3B50}" destId="{A182D7FB-FB83-4585-8AA2-5DA5C34C5E56}" srcOrd="0" destOrd="0" parTransId="{7133BBC9-EBFD-4570-ACA8-DA2E430785AD}" sibTransId="{238A18E9-D881-41F7-A616-21309DCC54BA}"/>
+    <dgm:cxn modelId="{51B9D6FA-1E1F-4665-99E6-FFE0441F0F0C}" type="presOf" srcId="{A826D8EC-B093-4DB2-9B6A-B7990A7C6664}" destId="{A1C9C73C-9DBA-442F-8EA7-B7BDFE2156A9}" srcOrd="1" destOrd="0" presId="urn:microsoft.com/office/officeart/2005/8/layout/lProcess2"/>
+    <dgm:cxn modelId="{C857506B-A909-4283-A856-FAFB56E3CE45}" type="presOf" srcId="{1A829594-E1B6-45CC-936F-124D40B0EA0B}" destId="{717087EA-DC7D-4B16-A04A-7BEF4CD60C0B}" srcOrd="0" destOrd="0" presId="urn:microsoft.com/office/officeart/2005/8/layout/lProcess2"/>
+    <dgm:cxn modelId="{CBC35384-752C-4046-B633-27B7E2EBCA9A}" srcId="{A826D8EC-B093-4DB2-9B6A-B7990A7C6664}" destId="{331F61E3-2A7D-4BBA-8A40-B03511887EDD}" srcOrd="0" destOrd="0" parTransId="{4E53E48B-49F4-4E53-B34D-F6AF7A9D2A4A}" sibTransId="{F262FEF7-24A4-4B28-B0B4-F9787B95B676}"/>
+    <dgm:cxn modelId="{4873DC4A-4272-4CB5-9274-8D330C70AB02}" type="presOf" srcId="{A182D7FB-FB83-4585-8AA2-5DA5C34C5E56}" destId="{E308E1CE-5436-4340-AA56-DC9A62DB1D1C}" srcOrd="1" destOrd="0" presId="urn:microsoft.com/office/officeart/2005/8/layout/lProcess2"/>
+    <dgm:cxn modelId="{436C73D8-B161-48B3-8452-EC0F4C84AF93}" type="presOf" srcId="{1A829594-E1B6-45CC-936F-124D40B0EA0B}" destId="{D9DBE475-8785-40C0-8EE3-678A07DCE16E}" srcOrd="1" destOrd="0" presId="urn:microsoft.com/office/officeart/2005/8/layout/lProcess2"/>
+    <dgm:cxn modelId="{AB618C4D-A67D-42D8-90F5-55EB39B847E6}" type="presParOf" srcId="{1B46F6F2-8DDB-42DA-A981-D30CCC64C73A}" destId="{902ACE76-9D27-4ED9-B622-2F97AF840C6C}" srcOrd="0" destOrd="0" presId="urn:microsoft.com/office/officeart/2005/8/layout/lProcess2"/>
+    <dgm:cxn modelId="{40F105CA-F427-49A9-8060-9028ACF4452B}" type="presParOf" srcId="{902ACE76-9D27-4ED9-B622-2F97AF840C6C}" destId="{E57A7402-6F5D-4234-8FCC-9D76FCCB4969}" srcOrd="0" destOrd="0" presId="urn:microsoft.com/office/officeart/2005/8/layout/lProcess2"/>
+    <dgm:cxn modelId="{D34EE83A-E080-4E2A-95A2-1AE014456A2A}" type="presParOf" srcId="{902ACE76-9D27-4ED9-B622-2F97AF840C6C}" destId="{E308E1CE-5436-4340-AA56-DC9A62DB1D1C}" srcOrd="1" destOrd="0" presId="urn:microsoft.com/office/officeart/2005/8/layout/lProcess2"/>
+    <dgm:cxn modelId="{AB69F8A1-CE1E-485F-BA43-C69BA696F6A9}" type="presParOf" srcId="{902ACE76-9D27-4ED9-B622-2F97AF840C6C}" destId="{4BE4B0E8-84EC-413B-8C0C-C1F7EA2D41EA}" srcOrd="2" destOrd="0" presId="urn:microsoft.com/office/officeart/2005/8/layout/lProcess2"/>
+    <dgm:cxn modelId="{F4C3DAF4-F179-4A57-A6BF-EE7835914AB7}" type="presParOf" srcId="{4BE4B0E8-84EC-413B-8C0C-C1F7EA2D41EA}" destId="{C3C06365-C37F-47D2-ABEC-A39ED027A9B8}" srcOrd="0" destOrd="0" presId="urn:microsoft.com/office/officeart/2005/8/layout/lProcess2"/>
+    <dgm:cxn modelId="{BF899052-3621-4719-8D6D-BA0DF9C88929}" type="presParOf" srcId="{C3C06365-C37F-47D2-ABEC-A39ED027A9B8}" destId="{3568F4EA-A521-4001-9720-2EE8C8BB2055}" srcOrd="0" destOrd="0" presId="urn:microsoft.com/office/officeart/2005/8/layout/lProcess2"/>
+    <dgm:cxn modelId="{9291C784-21C5-4640-9869-CE75EA92EF2D}" type="presParOf" srcId="{C3C06365-C37F-47D2-ABEC-A39ED027A9B8}" destId="{CDC13DEA-CEE5-4089-B972-012665E74260}" srcOrd="1" destOrd="0" presId="urn:microsoft.com/office/officeart/2005/8/layout/lProcess2"/>
+    <dgm:cxn modelId="{055A77A0-9F54-4233-9D6D-CC2EA528DFCB}" type="presParOf" srcId="{C3C06365-C37F-47D2-ABEC-A39ED027A9B8}" destId="{C07E69CC-54FD-4FA7-9E0E-3A1E8B355DC8}" srcOrd="2" destOrd="0" presId="urn:microsoft.com/office/officeart/2005/8/layout/lProcess2"/>
+    <dgm:cxn modelId="{A1587633-01CE-4203-91C5-B2ABAACB46FB}" type="presParOf" srcId="{1B46F6F2-8DDB-42DA-A981-D30CCC64C73A}" destId="{834A2E11-A0D9-4BA3-B5BA-3684DF59F1C5}" srcOrd="1" destOrd="0" presId="urn:microsoft.com/office/officeart/2005/8/layout/lProcess2"/>
+    <dgm:cxn modelId="{2A999038-7134-4797-A7BC-D801CA4F6379}" type="presParOf" srcId="{1B46F6F2-8DDB-42DA-A981-D30CCC64C73A}" destId="{D5DEAED9-D57C-49F8-AD76-FC104058F4FD}" srcOrd="2" destOrd="0" presId="urn:microsoft.com/office/officeart/2005/8/layout/lProcess2"/>
+    <dgm:cxn modelId="{028F6717-E6CE-4F78-8EB8-30A6A1C7E0C2}" type="presParOf" srcId="{D5DEAED9-D57C-49F8-AD76-FC104058F4FD}" destId="{26A4E411-939B-4651-A61A-05B1242849D3}" srcOrd="0" destOrd="0" presId="urn:microsoft.com/office/officeart/2005/8/layout/lProcess2"/>
+    <dgm:cxn modelId="{8E59202B-496E-4AF8-B581-3F1B46A9F92B}" type="presParOf" srcId="{D5DEAED9-D57C-49F8-AD76-FC104058F4FD}" destId="{A1C9C73C-9DBA-442F-8EA7-B7BDFE2156A9}" srcOrd="1" destOrd="0" presId="urn:microsoft.com/office/officeart/2005/8/layout/lProcess2"/>
+    <dgm:cxn modelId="{F2500ABF-ECF1-4CE6-97B0-0038F35B360F}" type="presParOf" srcId="{D5DEAED9-D57C-49F8-AD76-FC104058F4FD}" destId="{4FCFCC68-569F-4DE3-A7E4-4E4512201E75}" srcOrd="2" destOrd="0" presId="urn:microsoft.com/office/officeart/2005/8/layout/lProcess2"/>
+    <dgm:cxn modelId="{27C13071-FE32-4B8A-B607-CBFF579195E6}" type="presParOf" srcId="{4FCFCC68-569F-4DE3-A7E4-4E4512201E75}" destId="{DB7246AB-A46F-46B0-93DF-B901DCCED8BF}" srcOrd="0" destOrd="0" presId="urn:microsoft.com/office/officeart/2005/8/layout/lProcess2"/>
+    <dgm:cxn modelId="{83E79E02-A803-472E-B323-DB2F5FD50D18}" type="presParOf" srcId="{DB7246AB-A46F-46B0-93DF-B901DCCED8BF}" destId="{0960F51A-BB83-4055-9723-6C99E0C53508}" srcOrd="0" destOrd="0" presId="urn:microsoft.com/office/officeart/2005/8/layout/lProcess2"/>
+    <dgm:cxn modelId="{D90F277E-A556-48CF-8A1F-043A22B14A98}" type="presParOf" srcId="{DB7246AB-A46F-46B0-93DF-B901DCCED8BF}" destId="{69719A7F-37D4-4619-822E-25ED5AEF7F2C}" srcOrd="1" destOrd="0" presId="urn:microsoft.com/office/officeart/2005/8/layout/lProcess2"/>
+    <dgm:cxn modelId="{F3C3087C-33C3-4224-840C-41080A307095}" type="presParOf" srcId="{DB7246AB-A46F-46B0-93DF-B901DCCED8BF}" destId="{22EAFAC4-54E9-4394-93D3-79BCC8A5BD0A}" srcOrd="2" destOrd="0" presId="urn:microsoft.com/office/officeart/2005/8/layout/lProcess2"/>
+    <dgm:cxn modelId="{5D508498-6611-47BA-A289-0B64AF80AEF1}" type="presParOf" srcId="{1B46F6F2-8DDB-42DA-A981-D30CCC64C73A}" destId="{CF3F2D1E-0B26-4B9E-87A2-DBEF5A4F1E2C}" srcOrd="3" destOrd="0" presId="urn:microsoft.com/office/officeart/2005/8/layout/lProcess2"/>
+    <dgm:cxn modelId="{939C1A4C-0184-4D46-99D8-D9390E522142}" type="presParOf" srcId="{1B46F6F2-8DDB-42DA-A981-D30CCC64C73A}" destId="{43F4C97F-1AD4-46C3-88A4-29CDED25DA78}" srcOrd="4" destOrd="0" presId="urn:microsoft.com/office/officeart/2005/8/layout/lProcess2"/>
+    <dgm:cxn modelId="{9DCDAB29-2332-4192-AC57-84E8FFE1D0C6}" type="presParOf" srcId="{43F4C97F-1AD4-46C3-88A4-29CDED25DA78}" destId="{717087EA-DC7D-4B16-A04A-7BEF4CD60C0B}" srcOrd="0" destOrd="0" presId="urn:microsoft.com/office/officeart/2005/8/layout/lProcess2"/>
+    <dgm:cxn modelId="{DD44E58F-C7B4-46A3-BDD9-0995F9B03BE1}" type="presParOf" srcId="{43F4C97F-1AD4-46C3-88A4-29CDED25DA78}" destId="{D9DBE475-8785-40C0-8EE3-678A07DCE16E}" srcOrd="1" destOrd="0" presId="urn:microsoft.com/office/officeart/2005/8/layout/lProcess2"/>
+    <dgm:cxn modelId="{68E6F10F-DADD-4330-BD7A-DCEA20C2B28F}" type="presParOf" srcId="{43F4C97F-1AD4-46C3-88A4-29CDED25DA78}" destId="{4E12633A-6662-40AE-96B1-18ABED36C7A9}" srcOrd="2" destOrd="0" presId="urn:microsoft.com/office/officeart/2005/8/layout/lProcess2"/>
+    <dgm:cxn modelId="{2C9AAC78-6DAE-42A4-A665-261FB7F6C487}" type="presParOf" srcId="{4E12633A-6662-40AE-96B1-18ABED36C7A9}" destId="{A97BCC15-33B0-4A0A-80A1-5F61DC082FA4}" srcOrd="0" destOrd="0" presId="urn:microsoft.com/office/officeart/2005/8/layout/lProcess2"/>
+    <dgm:cxn modelId="{DC222912-647F-4676-B08E-CE12012A7442}" type="presParOf" srcId="{A97BCC15-33B0-4A0A-80A1-5F61DC082FA4}" destId="{9E7C08B4-5D4A-4881-B948-B7EE88DD96B0}" srcOrd="0" destOrd="0" presId="urn:microsoft.com/office/officeart/2005/8/layout/lProcess2"/>
+    <dgm:cxn modelId="{1A1795DA-198A-4B5B-8092-34CE2122A0F1}" type="presParOf" srcId="{A97BCC15-33B0-4A0A-80A1-5F61DC082FA4}" destId="{EFB85AD6-BF7B-411C-BF45-F314E58096A5}" srcOrd="1" destOrd="0" presId="urn:microsoft.com/office/officeart/2005/8/layout/lProcess2"/>
+    <dgm:cxn modelId="{61F50DD7-10AD-4486-A930-A11E9247E494}" type="presParOf" srcId="{A97BCC15-33B0-4A0A-80A1-5F61DC082FA4}" destId="{B9A821AA-5CE7-4802-8DFA-7B35B175EDAD}" srcOrd="2" destOrd="0" presId="urn:microsoft.com/office/officeart/2005/8/layout/lProcess2"/>
+  </dgm:cxnLst>
+  <dgm:bg/>
+  <dgm:whole/>
+  <dgm:extLst>
+    <a:ext uri="http://schemas.microsoft.com/office/drawing/2008/diagram">
+      <dsp:dataModelExt xmlns:dsp="http://schemas.microsoft.com/office/drawing/2008/diagram" relId="rId6" minVer="http://schemas.openxmlformats.org/drawingml/2006/diagram"/>
+    </a:ext>
+    <a:ext uri="{C62137D5-CB1D-491B-B009-E17868A290BF}">
+      <dgm14:recolorImg xmlns:dgm14="http://schemas.microsoft.com/office/drawing/2010/diagram" val="1"/>
     </a:ext>
   </dgm:extLst>
 </dgm:dataModel>
@@ -6190,6 +7862,968 @@
 </dsp:drawing>
 </file>
 
+<file path=ppt/diagrams/drawing5.xml><?xml version="1.0" encoding="utf-8"?>
+<dsp:drawing xmlns:dgm="http://schemas.openxmlformats.org/drawingml/2006/diagram" xmlns:dsp="http://schemas.microsoft.com/office/drawing/2008/diagram" xmlns:a="http://schemas.openxmlformats.org/drawingml/2006/main">
+  <dsp:spTree>
+    <dsp:nvGrpSpPr>
+      <dsp:cNvPr id="0" name=""/>
+      <dsp:cNvGrpSpPr/>
+    </dsp:nvGrpSpPr>
+    <dsp:grpSpPr/>
+    <dsp:sp modelId="{E57A7402-6F5D-4234-8FCC-9D76FCCB4969}">
+      <dsp:nvSpPr>
+        <dsp:cNvPr id="0" name=""/>
+        <dsp:cNvSpPr/>
+      </dsp:nvSpPr>
+      <dsp:spPr>
+        <a:xfrm>
+          <a:off x="1042" y="0"/>
+          <a:ext cx="2709660" cy="4689441"/>
+        </a:xfrm>
+        <a:prstGeom prst="roundRect">
+          <a:avLst>
+            <a:gd name="adj" fmla="val 10000"/>
+          </a:avLst>
+        </a:prstGeom>
+        <a:solidFill>
+          <a:schemeClr val="dk1">
+            <a:tint val="40000"/>
+            <a:hueOff val="0"/>
+            <a:satOff val="0"/>
+            <a:lumOff val="0"/>
+            <a:alphaOff val="0"/>
+          </a:schemeClr>
+        </a:solidFill>
+        <a:ln>
+          <a:noFill/>
+        </a:ln>
+        <a:effectLst/>
+      </dsp:spPr>
+      <dsp:style>
+        <a:lnRef idx="0">
+          <a:scrgbClr r="0" g="0" b="0"/>
+        </a:lnRef>
+        <a:fillRef idx="1">
+          <a:scrgbClr r="0" g="0" b="0"/>
+        </a:fillRef>
+        <a:effectRef idx="0">
+          <a:scrgbClr r="0" g="0" b="0"/>
+        </a:effectRef>
+        <a:fontRef idx="minor"/>
+      </dsp:style>
+      <dsp:txBody>
+        <a:bodyPr spcFirstLastPara="0" vert="horz" wrap="square" lIns="140970" tIns="140970" rIns="140970" bIns="140970" numCol="1" spcCol="1270" anchor="ctr" anchorCtr="0">
+          <a:noAutofit/>
+        </a:bodyPr>
+        <a:lstStyle/>
+        <a:p>
+          <a:pPr lvl="0" algn="ctr" defTabSz="1644650">
+            <a:lnSpc>
+              <a:spcPct val="90000"/>
+            </a:lnSpc>
+            <a:spcBef>
+              <a:spcPct val="0"/>
+            </a:spcBef>
+            <a:spcAft>
+              <a:spcPct val="35000"/>
+            </a:spcAft>
+          </a:pPr>
+          <a:r>
+            <a:rPr lang="en-US" sz="3700" b="1" kern="1200" dirty="0" err="1" smtClean="0"/>
+            <a:t>Topik</a:t>
+          </a:r>
+          <a:r>
+            <a:rPr lang="en-US" sz="3700" b="1" kern="1200" dirty="0" smtClean="0"/>
+            <a:t> </a:t>
+          </a:r>
+          <a:r>
+            <a:rPr lang="en-US" sz="3700" b="1" kern="1200" dirty="0" err="1" smtClean="0"/>
+            <a:t>Ulasan</a:t>
+          </a:r>
+          <a:endParaRPr lang="en-US" sz="3700" b="1" kern="1200" dirty="0"/>
+        </a:p>
+      </dsp:txBody>
+      <dsp:txXfrm>
+        <a:off x="1042" y="0"/>
+        <a:ext cx="2709660" cy="1406832"/>
+      </dsp:txXfrm>
+    </dsp:sp>
+    <dsp:sp modelId="{3568F4EA-A521-4001-9720-2EE8C8BB2055}">
+      <dsp:nvSpPr>
+        <dsp:cNvPr id="0" name=""/>
+        <dsp:cNvSpPr/>
+      </dsp:nvSpPr>
+      <dsp:spPr>
+        <a:xfrm>
+          <a:off x="272008" y="1408206"/>
+          <a:ext cx="2167728" cy="1413930"/>
+        </a:xfrm>
+        <a:prstGeom prst="roundRect">
+          <a:avLst>
+            <a:gd name="adj" fmla="val 10000"/>
+          </a:avLst>
+        </a:prstGeom>
+        <a:solidFill>
+          <a:schemeClr val="lt1">
+            <a:hueOff val="0"/>
+            <a:satOff val="0"/>
+            <a:lumOff val="0"/>
+            <a:alphaOff val="0"/>
+          </a:schemeClr>
+        </a:solidFill>
+        <a:ln w="15875" cap="rnd" cmpd="sng" algn="ctr">
+          <a:solidFill>
+            <a:schemeClr val="dk1">
+              <a:shade val="80000"/>
+              <a:hueOff val="0"/>
+              <a:satOff val="0"/>
+              <a:lumOff val="0"/>
+              <a:alphaOff val="0"/>
+            </a:schemeClr>
+          </a:solidFill>
+          <a:prstDash val="solid"/>
+        </a:ln>
+        <a:effectLst/>
+      </dsp:spPr>
+      <dsp:style>
+        <a:lnRef idx="2">
+          <a:scrgbClr r="0" g="0" b="0"/>
+        </a:lnRef>
+        <a:fillRef idx="1">
+          <a:scrgbClr r="0" g="0" b="0"/>
+        </a:fillRef>
+        <a:effectRef idx="0">
+          <a:scrgbClr r="0" g="0" b="0"/>
+        </a:effectRef>
+        <a:fontRef idx="minor">
+          <a:schemeClr val="lt1"/>
+        </a:fontRef>
+      </dsp:style>
+      <dsp:txBody>
+        <a:bodyPr spcFirstLastPara="0" vert="horz" wrap="square" lIns="40640" tIns="30480" rIns="40640" bIns="30480" numCol="1" spcCol="1270" anchor="ctr" anchorCtr="0">
+          <a:noAutofit/>
+        </a:bodyPr>
+        <a:lstStyle/>
+        <a:p>
+          <a:pPr lvl="0" algn="ctr" defTabSz="711200">
+            <a:lnSpc>
+              <a:spcPct val="90000"/>
+            </a:lnSpc>
+            <a:spcBef>
+              <a:spcPct val="0"/>
+            </a:spcBef>
+            <a:spcAft>
+              <a:spcPct val="35000"/>
+            </a:spcAft>
+          </a:pPr>
+          <a:r>
+            <a:rPr lang="en-US" sz="1600" kern="1200" dirty="0" smtClean="0"/>
+            <a:t>Tingkat </a:t>
+          </a:r>
+          <a:r>
+            <a:rPr lang="en-US" sz="1600" kern="1200" dirty="0" err="1" smtClean="0"/>
+            <a:t>kemudahan</a:t>
+          </a:r>
+          <a:r>
+            <a:rPr lang="en-US" sz="1600" kern="1200" dirty="0" smtClean="0"/>
+            <a:t> </a:t>
+          </a:r>
+          <a:r>
+            <a:rPr lang="en-US" sz="1600" kern="1200" dirty="0" err="1" smtClean="0"/>
+            <a:t>memahami</a:t>
+          </a:r>
+          <a:r>
+            <a:rPr lang="en-US" sz="1600" kern="1200" dirty="0" smtClean="0"/>
+            <a:t> idiom</a:t>
+          </a:r>
+          <a:endParaRPr lang="en-US" sz="1600" kern="1200" dirty="0"/>
+        </a:p>
+      </dsp:txBody>
+      <dsp:txXfrm>
+        <a:off x="313421" y="1449619"/>
+        <a:ext cx="2084902" cy="1331104"/>
+      </dsp:txXfrm>
+    </dsp:sp>
+    <dsp:sp modelId="{C07E69CC-54FD-4FA7-9E0E-3A1E8B355DC8}">
+      <dsp:nvSpPr>
+        <dsp:cNvPr id="0" name=""/>
+        <dsp:cNvSpPr/>
+      </dsp:nvSpPr>
+      <dsp:spPr>
+        <a:xfrm>
+          <a:off x="272008" y="3039664"/>
+          <a:ext cx="2167728" cy="1413930"/>
+        </a:xfrm>
+        <a:prstGeom prst="roundRect">
+          <a:avLst>
+            <a:gd name="adj" fmla="val 10000"/>
+          </a:avLst>
+        </a:prstGeom>
+        <a:solidFill>
+          <a:schemeClr val="lt1">
+            <a:hueOff val="0"/>
+            <a:satOff val="0"/>
+            <a:lumOff val="0"/>
+            <a:alphaOff val="0"/>
+          </a:schemeClr>
+        </a:solidFill>
+        <a:ln w="15875" cap="rnd" cmpd="sng" algn="ctr">
+          <a:solidFill>
+            <a:schemeClr val="dk1">
+              <a:shade val="80000"/>
+              <a:hueOff val="0"/>
+              <a:satOff val="0"/>
+              <a:lumOff val="0"/>
+              <a:alphaOff val="0"/>
+            </a:schemeClr>
+          </a:solidFill>
+          <a:prstDash val="solid"/>
+        </a:ln>
+        <a:effectLst/>
+      </dsp:spPr>
+      <dsp:style>
+        <a:lnRef idx="2">
+          <a:scrgbClr r="0" g="0" b="0"/>
+        </a:lnRef>
+        <a:fillRef idx="1">
+          <a:scrgbClr r="0" g="0" b="0"/>
+        </a:fillRef>
+        <a:effectRef idx="0">
+          <a:scrgbClr r="0" g="0" b="0"/>
+        </a:effectRef>
+        <a:fontRef idx="minor">
+          <a:schemeClr val="lt1"/>
+        </a:fontRef>
+      </dsp:style>
+      <dsp:txBody>
+        <a:bodyPr spcFirstLastPara="0" vert="horz" wrap="square" lIns="40640" tIns="30480" rIns="40640" bIns="30480" numCol="1" spcCol="1270" anchor="ctr" anchorCtr="0">
+          <a:noAutofit/>
+        </a:bodyPr>
+        <a:lstStyle/>
+        <a:p>
+          <a:pPr lvl="0" algn="ctr" defTabSz="711200">
+            <a:lnSpc>
+              <a:spcPct val="90000"/>
+            </a:lnSpc>
+            <a:spcBef>
+              <a:spcPct val="0"/>
+            </a:spcBef>
+            <a:spcAft>
+              <a:spcPct val="35000"/>
+            </a:spcAft>
+          </a:pPr>
+          <a:r>
+            <a:rPr lang="en-US" sz="1600" kern="1200" dirty="0" err="1" smtClean="0"/>
+            <a:t>Apakah</a:t>
+          </a:r>
+          <a:r>
+            <a:rPr lang="en-US" sz="1600" kern="1200" dirty="0" smtClean="0"/>
+            <a:t> idiom </a:t>
+          </a:r>
+          <a:r>
+            <a:rPr lang="en-US" sz="1600" kern="1200" dirty="0" err="1" smtClean="0"/>
+            <a:t>visualisasi</a:t>
+          </a:r>
+          <a:r>
+            <a:rPr lang="en-US" sz="1600" kern="1200" dirty="0" smtClean="0"/>
+            <a:t> </a:t>
+          </a:r>
+          <a:r>
+            <a:rPr lang="en-US" sz="1600" kern="1200" dirty="0" err="1" smtClean="0"/>
+            <a:t>sudah</a:t>
+          </a:r>
+          <a:r>
+            <a:rPr lang="en-US" sz="1600" kern="1200" dirty="0" smtClean="0"/>
+            <a:t> informative?</a:t>
+          </a:r>
+          <a:endParaRPr lang="en-US" sz="1600" kern="1200" dirty="0"/>
+        </a:p>
+      </dsp:txBody>
+      <dsp:txXfrm>
+        <a:off x="313421" y="3081077"/>
+        <a:ext cx="2084902" cy="1331104"/>
+      </dsp:txXfrm>
+    </dsp:sp>
+    <dsp:sp modelId="{26A4E411-939B-4651-A61A-05B1242849D3}">
+      <dsp:nvSpPr>
+        <dsp:cNvPr id="0" name=""/>
+        <dsp:cNvSpPr/>
+      </dsp:nvSpPr>
+      <dsp:spPr>
+        <a:xfrm>
+          <a:off x="2913927" y="0"/>
+          <a:ext cx="2709660" cy="4689441"/>
+        </a:xfrm>
+        <a:prstGeom prst="roundRect">
+          <a:avLst>
+            <a:gd name="adj" fmla="val 10000"/>
+          </a:avLst>
+        </a:prstGeom>
+        <a:solidFill>
+          <a:schemeClr val="dk1">
+            <a:tint val="40000"/>
+            <a:hueOff val="0"/>
+            <a:satOff val="0"/>
+            <a:lumOff val="0"/>
+            <a:alphaOff val="0"/>
+          </a:schemeClr>
+        </a:solidFill>
+        <a:ln>
+          <a:noFill/>
+        </a:ln>
+        <a:effectLst/>
+      </dsp:spPr>
+      <dsp:style>
+        <a:lnRef idx="0">
+          <a:scrgbClr r="0" g="0" b="0"/>
+        </a:lnRef>
+        <a:fillRef idx="1">
+          <a:scrgbClr r="0" g="0" b="0"/>
+        </a:fillRef>
+        <a:effectRef idx="0">
+          <a:scrgbClr r="0" g="0" b="0"/>
+        </a:effectRef>
+        <a:fontRef idx="minor"/>
+      </dsp:style>
+      <dsp:txBody>
+        <a:bodyPr spcFirstLastPara="0" vert="horz" wrap="square" lIns="140970" tIns="140970" rIns="140970" bIns="140970" numCol="1" spcCol="1270" anchor="ctr" anchorCtr="0">
+          <a:noAutofit/>
+        </a:bodyPr>
+        <a:lstStyle/>
+        <a:p>
+          <a:pPr lvl="0" algn="ctr" defTabSz="1644650">
+            <a:lnSpc>
+              <a:spcPct val="90000"/>
+            </a:lnSpc>
+            <a:spcBef>
+              <a:spcPct val="0"/>
+            </a:spcBef>
+            <a:spcAft>
+              <a:spcPct val="35000"/>
+            </a:spcAft>
+          </a:pPr>
+          <a:r>
+            <a:rPr lang="en-US" sz="3700" b="1" kern="1200" dirty="0" err="1" smtClean="0"/>
+            <a:t>Analisis</a:t>
+          </a:r>
+          <a:endParaRPr lang="en-US" sz="3700" b="1" kern="1200" dirty="0"/>
+        </a:p>
+      </dsp:txBody>
+      <dsp:txXfrm>
+        <a:off x="2913927" y="0"/>
+        <a:ext cx="2709660" cy="1406832"/>
+      </dsp:txXfrm>
+    </dsp:sp>
+    <dsp:sp modelId="{0960F51A-BB83-4055-9723-6C99E0C53508}">
+      <dsp:nvSpPr>
+        <dsp:cNvPr id="0" name=""/>
+        <dsp:cNvSpPr/>
+      </dsp:nvSpPr>
+      <dsp:spPr>
+        <a:xfrm>
+          <a:off x="3184893" y="1408206"/>
+          <a:ext cx="2167728" cy="1413930"/>
+        </a:xfrm>
+        <a:prstGeom prst="roundRect">
+          <a:avLst>
+            <a:gd name="adj" fmla="val 10000"/>
+          </a:avLst>
+        </a:prstGeom>
+        <a:solidFill>
+          <a:schemeClr val="lt1">
+            <a:hueOff val="0"/>
+            <a:satOff val="0"/>
+            <a:lumOff val="0"/>
+            <a:alphaOff val="0"/>
+          </a:schemeClr>
+        </a:solidFill>
+        <a:ln w="15875" cap="rnd" cmpd="sng" algn="ctr">
+          <a:solidFill>
+            <a:schemeClr val="dk1">
+              <a:shade val="80000"/>
+              <a:hueOff val="0"/>
+              <a:satOff val="0"/>
+              <a:lumOff val="0"/>
+              <a:alphaOff val="0"/>
+            </a:schemeClr>
+          </a:solidFill>
+          <a:prstDash val="solid"/>
+        </a:ln>
+        <a:effectLst/>
+      </dsp:spPr>
+      <dsp:style>
+        <a:lnRef idx="2">
+          <a:scrgbClr r="0" g="0" b="0"/>
+        </a:lnRef>
+        <a:fillRef idx="1">
+          <a:scrgbClr r="0" g="0" b="0"/>
+        </a:fillRef>
+        <a:effectRef idx="0">
+          <a:scrgbClr r="0" g="0" b="0"/>
+        </a:effectRef>
+        <a:fontRef idx="minor">
+          <a:schemeClr val="lt1"/>
+        </a:fontRef>
+      </dsp:style>
+      <dsp:txBody>
+        <a:bodyPr spcFirstLastPara="0" vert="horz" wrap="square" lIns="40640" tIns="30480" rIns="40640" bIns="30480" numCol="1" spcCol="1270" anchor="ctr" anchorCtr="0">
+          <a:noAutofit/>
+        </a:bodyPr>
+        <a:lstStyle/>
+        <a:p>
+          <a:pPr lvl="0" algn="ctr" defTabSz="711200">
+            <a:lnSpc>
+              <a:spcPct val="90000"/>
+            </a:lnSpc>
+            <a:spcBef>
+              <a:spcPct val="0"/>
+            </a:spcBef>
+            <a:spcAft>
+              <a:spcPct val="35000"/>
+            </a:spcAft>
+          </a:pPr>
+          <a:r>
+            <a:rPr lang="en-US" sz="1600" kern="1200" dirty="0" smtClean="0"/>
+            <a:t>80% </a:t>
+          </a:r>
+          <a:r>
+            <a:rPr lang="en-US" sz="1600" kern="1200" dirty="0" err="1" smtClean="0"/>
+            <a:t>responden</a:t>
+          </a:r>
+          <a:r>
+            <a:rPr lang="en-US" sz="1600" kern="1200" dirty="0" smtClean="0"/>
+            <a:t> </a:t>
+          </a:r>
+          <a:r>
+            <a:rPr lang="en-US" sz="1600" kern="1200" dirty="0" err="1" smtClean="0"/>
+            <a:t>memahami</a:t>
+          </a:r>
+          <a:r>
+            <a:rPr lang="en-US" sz="1600" kern="1200" dirty="0" smtClean="0"/>
+            <a:t> idiom </a:t>
+          </a:r>
+          <a:r>
+            <a:rPr lang="en-US" sz="1600" kern="1200" dirty="0" err="1" smtClean="0"/>
+            <a:t>dengan</a:t>
+          </a:r>
+          <a:r>
+            <a:rPr lang="en-US" sz="1600" kern="1200" dirty="0" smtClean="0"/>
+            <a:t> </a:t>
+          </a:r>
+          <a:r>
+            <a:rPr lang="en-US" sz="1600" kern="1200" dirty="0" err="1" smtClean="0"/>
+            <a:t>baik</a:t>
+          </a:r>
+          <a:endParaRPr lang="en-US" sz="1600" kern="1200" dirty="0"/>
+        </a:p>
+      </dsp:txBody>
+      <dsp:txXfrm>
+        <a:off x="3226306" y="1449619"/>
+        <a:ext cx="2084902" cy="1331104"/>
+      </dsp:txXfrm>
+    </dsp:sp>
+    <dsp:sp modelId="{22EAFAC4-54E9-4394-93D3-79BCC8A5BD0A}">
+      <dsp:nvSpPr>
+        <dsp:cNvPr id="0" name=""/>
+        <dsp:cNvSpPr/>
+      </dsp:nvSpPr>
+      <dsp:spPr>
+        <a:xfrm>
+          <a:off x="3184893" y="3039664"/>
+          <a:ext cx="2167728" cy="1413930"/>
+        </a:xfrm>
+        <a:prstGeom prst="roundRect">
+          <a:avLst>
+            <a:gd name="adj" fmla="val 10000"/>
+          </a:avLst>
+        </a:prstGeom>
+        <a:solidFill>
+          <a:schemeClr val="lt1">
+            <a:hueOff val="0"/>
+            <a:satOff val="0"/>
+            <a:lumOff val="0"/>
+            <a:alphaOff val="0"/>
+          </a:schemeClr>
+        </a:solidFill>
+        <a:ln w="15875" cap="rnd" cmpd="sng" algn="ctr">
+          <a:solidFill>
+            <a:schemeClr val="dk1">
+              <a:shade val="80000"/>
+              <a:hueOff val="0"/>
+              <a:satOff val="0"/>
+              <a:lumOff val="0"/>
+              <a:alphaOff val="0"/>
+            </a:schemeClr>
+          </a:solidFill>
+          <a:prstDash val="solid"/>
+        </a:ln>
+        <a:effectLst/>
+      </dsp:spPr>
+      <dsp:style>
+        <a:lnRef idx="2">
+          <a:scrgbClr r="0" g="0" b="0"/>
+        </a:lnRef>
+        <a:fillRef idx="1">
+          <a:scrgbClr r="0" g="0" b="0"/>
+        </a:fillRef>
+        <a:effectRef idx="0">
+          <a:scrgbClr r="0" g="0" b="0"/>
+        </a:effectRef>
+        <a:fontRef idx="minor">
+          <a:schemeClr val="lt1"/>
+        </a:fontRef>
+      </dsp:style>
+      <dsp:txBody>
+        <a:bodyPr spcFirstLastPara="0" vert="horz" wrap="square" lIns="40640" tIns="30480" rIns="40640" bIns="30480" numCol="1" spcCol="1270" anchor="ctr" anchorCtr="0">
+          <a:noAutofit/>
+        </a:bodyPr>
+        <a:lstStyle/>
+        <a:p>
+          <a:pPr lvl="0" algn="ctr" defTabSz="711200">
+            <a:lnSpc>
+              <a:spcPct val="90000"/>
+            </a:lnSpc>
+            <a:spcBef>
+              <a:spcPct val="0"/>
+            </a:spcBef>
+            <a:spcAft>
+              <a:spcPct val="35000"/>
+            </a:spcAft>
+          </a:pPr>
+          <a:r>
+            <a:rPr lang="en-US" sz="1600" kern="1200" dirty="0" smtClean="0"/>
+            <a:t>20% </a:t>
+          </a:r>
+          <a:r>
+            <a:rPr lang="en-US" sz="1600" kern="1200" dirty="0" err="1" smtClean="0"/>
+            <a:t>responden</a:t>
+          </a:r>
+          <a:r>
+            <a:rPr lang="en-US" sz="1600" kern="1200" dirty="0" smtClean="0"/>
+            <a:t> </a:t>
+          </a:r>
+          <a:r>
+            <a:rPr lang="en-US" sz="1600" kern="1200" dirty="0" err="1" smtClean="0"/>
+            <a:t>membutuhkan</a:t>
+          </a:r>
+          <a:r>
+            <a:rPr lang="en-US" sz="1600" kern="1200" dirty="0" smtClean="0"/>
+            <a:t> </a:t>
+          </a:r>
+          <a:r>
+            <a:rPr lang="en-US" sz="1600" kern="1200" dirty="0" err="1" smtClean="0"/>
+            <a:t>lebih</a:t>
+          </a:r>
+          <a:r>
+            <a:rPr lang="en-US" sz="1600" kern="1200" dirty="0" smtClean="0"/>
+            <a:t> </a:t>
+          </a:r>
+          <a:r>
+            <a:rPr lang="en-US" sz="1600" kern="1200" dirty="0" err="1" smtClean="0"/>
+            <a:t>banyak</a:t>
+          </a:r>
+          <a:r>
+            <a:rPr lang="en-US" sz="1600" kern="1200" dirty="0" smtClean="0"/>
+            <a:t> </a:t>
+          </a:r>
+          <a:r>
+            <a:rPr lang="en-US" sz="1600" kern="1200" dirty="0" err="1" smtClean="0"/>
+            <a:t>wwaktu</a:t>
+          </a:r>
+          <a:r>
+            <a:rPr lang="en-US" sz="1600" kern="1200" dirty="0" smtClean="0"/>
+            <a:t> </a:t>
+          </a:r>
+          <a:r>
+            <a:rPr lang="en-US" sz="1600" kern="1200" dirty="0" err="1" smtClean="0"/>
+            <a:t>untuk</a:t>
+          </a:r>
+          <a:r>
+            <a:rPr lang="en-US" sz="1600" kern="1200" dirty="0" smtClean="0"/>
+            <a:t> </a:t>
+          </a:r>
+          <a:r>
+            <a:rPr lang="en-US" sz="1600" kern="1200" dirty="0" err="1" smtClean="0"/>
+            <a:t>memahami</a:t>
+          </a:r>
+          <a:endParaRPr lang="en-US" sz="1600" kern="1200" dirty="0"/>
+        </a:p>
+      </dsp:txBody>
+      <dsp:txXfrm>
+        <a:off x="3226306" y="3081077"/>
+        <a:ext cx="2084902" cy="1331104"/>
+      </dsp:txXfrm>
+    </dsp:sp>
+    <dsp:sp modelId="{717087EA-DC7D-4B16-A04A-7BEF4CD60C0B}">
+      <dsp:nvSpPr>
+        <dsp:cNvPr id="0" name=""/>
+        <dsp:cNvSpPr/>
+      </dsp:nvSpPr>
+      <dsp:spPr>
+        <a:xfrm>
+          <a:off x="5826812" y="0"/>
+          <a:ext cx="2709660" cy="4689441"/>
+        </a:xfrm>
+        <a:prstGeom prst="roundRect">
+          <a:avLst>
+            <a:gd name="adj" fmla="val 10000"/>
+          </a:avLst>
+        </a:prstGeom>
+        <a:solidFill>
+          <a:schemeClr val="dk1">
+            <a:tint val="40000"/>
+            <a:hueOff val="0"/>
+            <a:satOff val="0"/>
+            <a:lumOff val="0"/>
+            <a:alphaOff val="0"/>
+          </a:schemeClr>
+        </a:solidFill>
+        <a:ln>
+          <a:noFill/>
+        </a:ln>
+        <a:effectLst/>
+      </dsp:spPr>
+      <dsp:style>
+        <a:lnRef idx="0">
+          <a:scrgbClr r="0" g="0" b="0"/>
+        </a:lnRef>
+        <a:fillRef idx="1">
+          <a:scrgbClr r="0" g="0" b="0"/>
+        </a:fillRef>
+        <a:effectRef idx="0">
+          <a:scrgbClr r="0" g="0" b="0"/>
+        </a:effectRef>
+        <a:fontRef idx="minor"/>
+      </dsp:style>
+      <dsp:txBody>
+        <a:bodyPr spcFirstLastPara="0" vert="horz" wrap="square" lIns="140970" tIns="140970" rIns="140970" bIns="140970" numCol="1" spcCol="1270" anchor="ctr" anchorCtr="0">
+          <a:noAutofit/>
+        </a:bodyPr>
+        <a:lstStyle/>
+        <a:p>
+          <a:pPr lvl="0" algn="ctr" defTabSz="1644650">
+            <a:lnSpc>
+              <a:spcPct val="90000"/>
+            </a:lnSpc>
+            <a:spcBef>
+              <a:spcPct val="0"/>
+            </a:spcBef>
+            <a:spcAft>
+              <a:spcPct val="35000"/>
+            </a:spcAft>
+          </a:pPr>
+          <a:r>
+            <a:rPr lang="en-US" sz="3700" b="1" kern="1200" dirty="0" err="1" smtClean="0"/>
+            <a:t>Kesimpulan</a:t>
+          </a:r>
+          <a:endParaRPr lang="en-US" sz="3700" b="1" kern="1200" dirty="0"/>
+        </a:p>
+      </dsp:txBody>
+      <dsp:txXfrm>
+        <a:off x="5826812" y="0"/>
+        <a:ext cx="2709660" cy="1406832"/>
+      </dsp:txXfrm>
+    </dsp:sp>
+    <dsp:sp modelId="{9E7C08B4-5D4A-4881-B948-B7EE88DD96B0}">
+      <dsp:nvSpPr>
+        <dsp:cNvPr id="0" name=""/>
+        <dsp:cNvSpPr/>
+      </dsp:nvSpPr>
+      <dsp:spPr>
+        <a:xfrm>
+          <a:off x="6097778" y="1408206"/>
+          <a:ext cx="2167728" cy="1413930"/>
+        </a:xfrm>
+        <a:prstGeom prst="roundRect">
+          <a:avLst>
+            <a:gd name="adj" fmla="val 10000"/>
+          </a:avLst>
+        </a:prstGeom>
+        <a:solidFill>
+          <a:schemeClr val="lt1">
+            <a:hueOff val="0"/>
+            <a:satOff val="0"/>
+            <a:lumOff val="0"/>
+            <a:alphaOff val="0"/>
+          </a:schemeClr>
+        </a:solidFill>
+        <a:ln w="15875" cap="rnd" cmpd="sng" algn="ctr">
+          <a:solidFill>
+            <a:schemeClr val="dk1">
+              <a:shade val="80000"/>
+              <a:hueOff val="0"/>
+              <a:satOff val="0"/>
+              <a:lumOff val="0"/>
+              <a:alphaOff val="0"/>
+            </a:schemeClr>
+          </a:solidFill>
+          <a:prstDash val="solid"/>
+        </a:ln>
+        <a:effectLst/>
+      </dsp:spPr>
+      <dsp:style>
+        <a:lnRef idx="2">
+          <a:scrgbClr r="0" g="0" b="0"/>
+        </a:lnRef>
+        <a:fillRef idx="1">
+          <a:scrgbClr r="0" g="0" b="0"/>
+        </a:fillRef>
+        <a:effectRef idx="0">
+          <a:scrgbClr r="0" g="0" b="0"/>
+        </a:effectRef>
+        <a:fontRef idx="minor">
+          <a:schemeClr val="lt1"/>
+        </a:fontRef>
+      </dsp:style>
+      <dsp:txBody>
+        <a:bodyPr spcFirstLastPara="0" vert="horz" wrap="square" lIns="40640" tIns="30480" rIns="40640" bIns="30480" numCol="1" spcCol="1270" anchor="ctr" anchorCtr="0">
+          <a:noAutofit/>
+        </a:bodyPr>
+        <a:lstStyle/>
+        <a:p>
+          <a:pPr lvl="0" algn="ctr" defTabSz="711200">
+            <a:lnSpc>
+              <a:spcPct val="90000"/>
+            </a:lnSpc>
+            <a:spcBef>
+              <a:spcPct val="0"/>
+            </a:spcBef>
+            <a:spcAft>
+              <a:spcPct val="35000"/>
+            </a:spcAft>
+          </a:pPr>
+          <a:r>
+            <a:rPr lang="en-US" sz="1600" kern="1200" dirty="0" err="1" smtClean="0"/>
+            <a:t>Ketiga</a:t>
+          </a:r>
+          <a:r>
+            <a:rPr lang="en-US" sz="1600" kern="1200" dirty="0" smtClean="0"/>
+            <a:t> idiom </a:t>
+          </a:r>
+          <a:r>
+            <a:rPr lang="en-US" sz="1600" kern="1200" dirty="0" err="1" smtClean="0"/>
+            <a:t>visualisasi</a:t>
+          </a:r>
+          <a:r>
+            <a:rPr lang="en-US" sz="1600" kern="1200" dirty="0" smtClean="0"/>
+            <a:t> yang </a:t>
+          </a:r>
+          <a:r>
+            <a:rPr lang="en-US" sz="1600" kern="1200" dirty="0" err="1" smtClean="0"/>
+            <a:t>dihasilkan</a:t>
+          </a:r>
+          <a:r>
+            <a:rPr lang="en-US" sz="1600" kern="1200" dirty="0" smtClean="0"/>
+            <a:t> </a:t>
+          </a:r>
+          <a:r>
+            <a:rPr lang="en-US" sz="1600" kern="1200" dirty="0" err="1" smtClean="0"/>
+            <a:t>dimengerti</a:t>
+          </a:r>
+          <a:r>
+            <a:rPr lang="en-US" sz="1600" kern="1200" dirty="0" smtClean="0"/>
+            <a:t> </a:t>
+          </a:r>
+          <a:r>
+            <a:rPr lang="en-US" sz="1600" kern="1200" dirty="0" err="1" smtClean="0"/>
+            <a:t>oleh</a:t>
+          </a:r>
+          <a:r>
+            <a:rPr lang="en-US" sz="1600" kern="1200" dirty="0" smtClean="0"/>
+            <a:t> </a:t>
+          </a:r>
+          <a:r>
+            <a:rPr lang="en-US" sz="1600" kern="1200" dirty="0" err="1" smtClean="0"/>
+            <a:t>sebagian</a:t>
+          </a:r>
+          <a:r>
+            <a:rPr lang="en-US" sz="1600" kern="1200" dirty="0" smtClean="0"/>
+            <a:t> </a:t>
+          </a:r>
+          <a:r>
+            <a:rPr lang="en-US" sz="1600" kern="1200" dirty="0" err="1" smtClean="0"/>
+            <a:t>besar</a:t>
+          </a:r>
+          <a:r>
+            <a:rPr lang="en-US" sz="1600" kern="1200" dirty="0" smtClean="0"/>
+            <a:t> orang.</a:t>
+          </a:r>
+          <a:endParaRPr lang="en-US" sz="1600" kern="1200" dirty="0"/>
+        </a:p>
+      </dsp:txBody>
+      <dsp:txXfrm>
+        <a:off x="6139191" y="1449619"/>
+        <a:ext cx="2084902" cy="1331104"/>
+      </dsp:txXfrm>
+    </dsp:sp>
+    <dsp:sp modelId="{B9A821AA-5CE7-4802-8DFA-7B35B175EDAD}">
+      <dsp:nvSpPr>
+        <dsp:cNvPr id="0" name=""/>
+        <dsp:cNvSpPr/>
+      </dsp:nvSpPr>
+      <dsp:spPr>
+        <a:xfrm>
+          <a:off x="6097778" y="3039664"/>
+          <a:ext cx="2167728" cy="1413930"/>
+        </a:xfrm>
+        <a:prstGeom prst="roundRect">
+          <a:avLst>
+            <a:gd name="adj" fmla="val 10000"/>
+          </a:avLst>
+        </a:prstGeom>
+        <a:solidFill>
+          <a:schemeClr val="lt1">
+            <a:hueOff val="0"/>
+            <a:satOff val="0"/>
+            <a:lumOff val="0"/>
+            <a:alphaOff val="0"/>
+          </a:schemeClr>
+        </a:solidFill>
+        <a:ln w="15875" cap="rnd" cmpd="sng" algn="ctr">
+          <a:solidFill>
+            <a:schemeClr val="dk1">
+              <a:shade val="80000"/>
+              <a:hueOff val="0"/>
+              <a:satOff val="0"/>
+              <a:lumOff val="0"/>
+              <a:alphaOff val="0"/>
+            </a:schemeClr>
+          </a:solidFill>
+          <a:prstDash val="solid"/>
+        </a:ln>
+        <a:effectLst/>
+      </dsp:spPr>
+      <dsp:style>
+        <a:lnRef idx="2">
+          <a:scrgbClr r="0" g="0" b="0"/>
+        </a:lnRef>
+        <a:fillRef idx="1">
+          <a:scrgbClr r="0" g="0" b="0"/>
+        </a:fillRef>
+        <a:effectRef idx="0">
+          <a:scrgbClr r="0" g="0" b="0"/>
+        </a:effectRef>
+        <a:fontRef idx="minor">
+          <a:schemeClr val="lt1"/>
+        </a:fontRef>
+      </dsp:style>
+      <dsp:txBody>
+        <a:bodyPr spcFirstLastPara="0" vert="horz" wrap="square" lIns="40640" tIns="30480" rIns="40640" bIns="30480" numCol="1" spcCol="1270" anchor="ctr" anchorCtr="0">
+          <a:noAutofit/>
+        </a:bodyPr>
+        <a:lstStyle/>
+        <a:p>
+          <a:pPr lvl="0" algn="ctr" defTabSz="711200">
+            <a:lnSpc>
+              <a:spcPct val="90000"/>
+            </a:lnSpc>
+            <a:spcBef>
+              <a:spcPct val="0"/>
+            </a:spcBef>
+            <a:spcAft>
+              <a:spcPct val="35000"/>
+            </a:spcAft>
+          </a:pPr>
+          <a:r>
+            <a:rPr lang="en-US" sz="1600" kern="1200" dirty="0" err="1" smtClean="0"/>
+            <a:t>Namun</a:t>
+          </a:r>
+          <a:r>
+            <a:rPr lang="en-US" sz="1600" kern="1200" dirty="0" smtClean="0"/>
+            <a:t>, </a:t>
+          </a:r>
+          <a:r>
+            <a:rPr lang="en-US" sz="1600" kern="1200" dirty="0" err="1" smtClean="0"/>
+            <a:t>sebagian</a:t>
+          </a:r>
+          <a:r>
+            <a:rPr lang="en-US" sz="1600" kern="1200" dirty="0" smtClean="0"/>
+            <a:t> </a:t>
+          </a:r>
+          <a:r>
+            <a:rPr lang="en-US" sz="1600" kern="1200" dirty="0" err="1" smtClean="0"/>
+            <a:t>kecil</a:t>
+          </a:r>
+          <a:r>
+            <a:rPr lang="en-US" sz="1600" kern="1200" dirty="0" smtClean="0"/>
+            <a:t> </a:t>
+          </a:r>
+          <a:r>
+            <a:rPr lang="en-US" sz="1600" kern="1200" dirty="0" err="1" smtClean="0"/>
+            <a:t>mengalami</a:t>
+          </a:r>
+          <a:r>
+            <a:rPr lang="en-US" sz="1600" kern="1200" dirty="0" smtClean="0"/>
+            <a:t> </a:t>
+          </a:r>
+          <a:r>
+            <a:rPr lang="en-US" sz="1600" kern="1200" dirty="0" err="1" smtClean="0"/>
+            <a:t>sedikit</a:t>
+          </a:r>
+          <a:r>
+            <a:rPr lang="en-US" sz="1600" kern="1200" dirty="0" smtClean="0"/>
+            <a:t> </a:t>
+          </a:r>
+          <a:r>
+            <a:rPr lang="en-US" sz="1600" kern="1200" dirty="0" err="1" smtClean="0"/>
+            <a:t>kesulitan</a:t>
+          </a:r>
+          <a:r>
+            <a:rPr lang="en-US" sz="1600" kern="1200" dirty="0" smtClean="0"/>
+            <a:t>. </a:t>
+          </a:r>
+          <a:r>
+            <a:rPr lang="en-US" sz="1600" kern="1200" dirty="0" err="1" smtClean="0"/>
+            <a:t>Sehingga</a:t>
+          </a:r>
+          <a:r>
+            <a:rPr lang="en-US" sz="1600" kern="1200" dirty="0" smtClean="0"/>
+            <a:t> </a:t>
+          </a:r>
+          <a:r>
+            <a:rPr lang="en-US" sz="1600" kern="1200" dirty="0" err="1" smtClean="0"/>
+            <a:t>perlu</a:t>
+          </a:r>
+          <a:r>
+            <a:rPr lang="en-US" sz="1600" kern="1200" dirty="0" smtClean="0"/>
+            <a:t> </a:t>
+          </a:r>
+          <a:r>
+            <a:rPr lang="en-US" sz="1600" kern="1200" dirty="0" err="1" smtClean="0"/>
+            <a:t>dilakukan</a:t>
+          </a:r>
+          <a:r>
+            <a:rPr lang="en-US" sz="1600" kern="1200" dirty="0" smtClean="0"/>
+            <a:t> </a:t>
+          </a:r>
+          <a:r>
+            <a:rPr lang="en-US" sz="1600" kern="1200" dirty="0" err="1" smtClean="0"/>
+            <a:t>sedikit</a:t>
+          </a:r>
+          <a:r>
+            <a:rPr lang="en-US" sz="1600" kern="1200" dirty="0" smtClean="0"/>
+            <a:t> </a:t>
+          </a:r>
+          <a:r>
+            <a:rPr lang="en-US" sz="1600" kern="1200" dirty="0" err="1" smtClean="0"/>
+            <a:t>perbaikan</a:t>
+          </a:r>
+          <a:r>
+            <a:rPr lang="en-US" sz="1600" kern="1200" dirty="0" smtClean="0"/>
+            <a:t>.</a:t>
+          </a:r>
+          <a:endParaRPr lang="en-US" sz="1600" kern="1200" dirty="0"/>
+        </a:p>
+      </dsp:txBody>
+      <dsp:txXfrm>
+        <a:off x="6139191" y="3081077"/>
+        <a:ext cx="2084902" cy="1331104"/>
+      </dsp:txXfrm>
+    </dsp:sp>
+  </dsp:spTree>
+</dsp:drawing>
+</file>
+
 <file path=ppt/diagrams/layout1.xml><?xml version="1.0" encoding="utf-8"?>
 <dgm:layoutDef xmlns:dgm="http://schemas.openxmlformats.org/drawingml/2006/diagram" xmlns:a="http://schemas.openxmlformats.org/drawingml/2006/main" uniqueId="urn:microsoft.com/office/officeart/2011/layout/Picture Frame">
   <dgm:title val="Picture Frame"/>
@@ -6894,6 +9528,233 @@
 </dgm:layoutDef>
 </file>
 
+<file path=ppt/diagrams/layout5.xml><?xml version="1.0" encoding="utf-8"?>
+<dgm:layoutDef xmlns:dgm="http://schemas.openxmlformats.org/drawingml/2006/diagram" xmlns:a="http://schemas.openxmlformats.org/drawingml/2006/main" uniqueId="urn:microsoft.com/office/officeart/2005/8/layout/lProcess2">
+  <dgm:title val=""/>
+  <dgm:desc val=""/>
+  <dgm:catLst>
+    <dgm:cat type="list" pri="10000"/>
+    <dgm:cat type="relationship" pri="13000"/>
+  </dgm:catLst>
+  <dgm:sampData>
+    <dgm:dataModel>
+      <dgm:ptLst>
+        <dgm:pt modelId="0" type="doc"/>
+        <dgm:pt modelId="1">
+          <dgm:prSet phldr="1"/>
+        </dgm:pt>
+        <dgm:pt modelId="11">
+          <dgm:prSet phldr="1"/>
+        </dgm:pt>
+        <dgm:pt modelId="12">
+          <dgm:prSet phldr="1"/>
+        </dgm:pt>
+        <dgm:pt modelId="2">
+          <dgm:prSet phldr="1"/>
+        </dgm:pt>
+        <dgm:pt modelId="21">
+          <dgm:prSet phldr="1"/>
+        </dgm:pt>
+        <dgm:pt modelId="22">
+          <dgm:prSet phldr="1"/>
+        </dgm:pt>
+        <dgm:pt modelId="3">
+          <dgm:prSet phldr="1"/>
+        </dgm:pt>
+        <dgm:pt modelId="31">
+          <dgm:prSet phldr="1"/>
+        </dgm:pt>
+        <dgm:pt modelId="32">
+          <dgm:prSet phldr="1"/>
+        </dgm:pt>
+      </dgm:ptLst>
+      <dgm:cxnLst>
+        <dgm:cxn modelId="4" srcId="0" destId="1" srcOrd="0" destOrd="0"/>
+        <dgm:cxn modelId="5" srcId="0" destId="2" srcOrd="1" destOrd="0"/>
+        <dgm:cxn modelId="13" srcId="1" destId="11" srcOrd="0" destOrd="0"/>
+        <dgm:cxn modelId="14" srcId="1" destId="12" srcOrd="0" destOrd="0"/>
+        <dgm:cxn modelId="23" srcId="2" destId="21" srcOrd="0" destOrd="0"/>
+        <dgm:cxn modelId="24" srcId="2" destId="22" srcOrd="0" destOrd="0"/>
+        <dgm:cxn modelId="33" srcId="3" destId="31" srcOrd="0" destOrd="0"/>
+        <dgm:cxn modelId="34" srcId="3" destId="32" srcOrd="0" destOrd="0"/>
+      </dgm:cxnLst>
+      <dgm:bg/>
+      <dgm:whole/>
+    </dgm:dataModel>
+  </dgm:sampData>
+  <dgm:styleData useDef="1">
+    <dgm:dataModel>
+      <dgm:ptLst/>
+      <dgm:bg/>
+      <dgm:whole/>
+    </dgm:dataModel>
+  </dgm:styleData>
+  <dgm:clrData useDef="1">
+    <dgm:dataModel>
+      <dgm:ptLst/>
+      <dgm:bg/>
+      <dgm:whole/>
+    </dgm:dataModel>
+  </dgm:clrData>
+  <dgm:layoutNode name="theList">
+    <dgm:varLst>
+      <dgm:dir/>
+      <dgm:animLvl val="lvl"/>
+      <dgm:resizeHandles val="exact"/>
+    </dgm:varLst>
+    <dgm:choose name="Name0">
+      <dgm:if name="Name1" func="var" arg="dir" op="equ" val="norm">
+        <dgm:alg type="lin"/>
+      </dgm:if>
+      <dgm:else name="Name2">
+        <dgm:alg type="lin">
+          <dgm:param type="linDir" val="fromR"/>
+        </dgm:alg>
+      </dgm:else>
+    </dgm:choose>
+    <dgm:shape xmlns:r="http://schemas.openxmlformats.org/officeDocument/2006/relationships" r:blip="">
+      <dgm:adjLst/>
+    </dgm:shape>
+    <dgm:presOf/>
+    <dgm:constrLst>
+      <dgm:constr type="w" for="ch" forName="compNode" refType="w"/>
+      <dgm:constr type="h" for="ch" forName="compNode" refType="h"/>
+      <dgm:constr type="w" for="ch" forName="aSpace" refType="w" fact="0.075"/>
+      <dgm:constr type="h" for="des" forName="aSpace2" refType="h" fact="0.1"/>
+      <dgm:constr type="primFontSz" for="des" forName="textNode" op="equ"/>
+      <dgm:constr type="primFontSz" for="des" forName="childNode" op="equ"/>
+    </dgm:constrLst>
+    <dgm:ruleLst/>
+    <dgm:forEach name="aNodeForEach" axis="ch" ptType="node">
+      <dgm:layoutNode name="compNode">
+        <dgm:alg type="composite"/>
+        <dgm:shape xmlns:r="http://schemas.openxmlformats.org/officeDocument/2006/relationships" r:blip="">
+          <dgm:adjLst/>
+        </dgm:shape>
+        <dgm:presOf/>
+        <dgm:constrLst>
+          <dgm:constr type="w" for="ch" forName="aNode" refType="w"/>
+          <dgm:constr type="h" for="ch" forName="aNode" refType="h"/>
+          <dgm:constr type="w" for="ch" forName="textNode" refType="w"/>
+          <dgm:constr type="h" for="ch" forName="textNode" refType="h" fact="0.3"/>
+          <dgm:constr type="ctrX" for="ch" forName="textNode" refType="w" fact="0.5"/>
+          <dgm:constr type="w" for="ch" forName="compChildNode" refType="w" fact="0.8"/>
+          <dgm:constr type="h" for="ch" forName="compChildNode" refType="h" fact="0.65"/>
+          <dgm:constr type="t" for="ch" forName="compChildNode" refType="h" fact="0.3"/>
+          <dgm:constr type="ctrX" for="ch" forName="compChildNode" refType="w" fact="0.5"/>
+        </dgm:constrLst>
+        <dgm:ruleLst/>
+        <dgm:layoutNode name="aNode" styleLbl="bgShp">
+          <dgm:alg type="sp"/>
+          <dgm:shape xmlns:r="http://schemas.openxmlformats.org/officeDocument/2006/relationships" type="roundRect" r:blip="">
+            <dgm:adjLst>
+              <dgm:adj idx="1" val="0.1"/>
+            </dgm:adjLst>
+          </dgm:shape>
+          <dgm:presOf axis="self"/>
+          <dgm:constrLst/>
+          <dgm:ruleLst/>
+        </dgm:layoutNode>
+        <dgm:layoutNode name="textNode" styleLbl="bgShp">
+          <dgm:alg type="tx"/>
+          <dgm:shape xmlns:r="http://schemas.openxmlformats.org/officeDocument/2006/relationships" type="rect" r:blip="" hideGeom="1">
+            <dgm:adjLst>
+              <dgm:adj idx="1" val="0.1"/>
+            </dgm:adjLst>
+          </dgm:shape>
+          <dgm:presOf axis="self"/>
+          <dgm:constrLst>
+            <dgm:constr type="primFontSz" val="65"/>
+            <dgm:constr type="lMarg" refType="primFontSz" fact="0.3"/>
+            <dgm:constr type="rMarg" refType="primFontSz" fact="0.3"/>
+            <dgm:constr type="tMarg" refType="primFontSz" fact="0.3"/>
+            <dgm:constr type="bMarg" refType="primFontSz" fact="0.3"/>
+          </dgm:constrLst>
+          <dgm:ruleLst>
+            <dgm:rule type="primFontSz" val="5" fact="NaN" max="NaN"/>
+          </dgm:ruleLst>
+        </dgm:layoutNode>
+        <dgm:layoutNode name="compChildNode">
+          <dgm:alg type="composite"/>
+          <dgm:shape xmlns:r="http://schemas.openxmlformats.org/officeDocument/2006/relationships" r:blip="">
+            <dgm:adjLst/>
+          </dgm:shape>
+          <dgm:presOf/>
+          <dgm:constrLst>
+            <dgm:constr type="w" for="des" forName="childNode" refType="w"/>
+            <dgm:constr type="h" for="des" forName="childNode" refType="h"/>
+          </dgm:constrLst>
+          <dgm:ruleLst/>
+          <dgm:layoutNode name="theInnerList">
+            <dgm:alg type="lin">
+              <dgm:param type="linDir" val="fromT"/>
+            </dgm:alg>
+            <dgm:shape xmlns:r="http://schemas.openxmlformats.org/officeDocument/2006/relationships" r:blip="">
+              <dgm:adjLst/>
+            </dgm:shape>
+            <dgm:presOf/>
+            <dgm:constrLst/>
+            <dgm:ruleLst/>
+            <dgm:forEach name="childNodeForEach" axis="ch" ptType="node">
+              <dgm:layoutNode name="childNode" styleLbl="node1">
+                <dgm:varLst>
+                  <dgm:bulletEnabled val="1"/>
+                </dgm:varLst>
+                <dgm:alg type="tx"/>
+                <dgm:shape xmlns:r="http://schemas.openxmlformats.org/officeDocument/2006/relationships" type="roundRect" r:blip="">
+                  <dgm:adjLst>
+                    <dgm:adj idx="1" val="0.1"/>
+                  </dgm:adjLst>
+                </dgm:shape>
+                <dgm:presOf axis="desOrSelf" ptType="node"/>
+                <dgm:constrLst>
+                  <dgm:constr type="primFontSz" val="65"/>
+                  <dgm:constr type="tMarg" refType="primFontSz" fact="0.15"/>
+                  <dgm:constr type="bMarg" refType="primFontSz" fact="0.15"/>
+                  <dgm:constr type="lMarg" refType="primFontSz" fact="0.2"/>
+                  <dgm:constr type="rMarg" refType="primFontSz" fact="0.2"/>
+                </dgm:constrLst>
+                <dgm:ruleLst>
+                  <dgm:rule type="primFontSz" val="5" fact="NaN" max="NaN"/>
+                </dgm:ruleLst>
+              </dgm:layoutNode>
+              <dgm:choose name="Name3">
+                <dgm:if name="Name4" axis="self" ptType="node" func="revPos" op="equ" val="1"/>
+                <dgm:else name="Name5">
+                  <dgm:layoutNode name="aSpace2">
+                    <dgm:alg type="sp"/>
+                    <dgm:shape xmlns:r="http://schemas.openxmlformats.org/officeDocument/2006/relationships" r:blip="">
+                      <dgm:adjLst/>
+                    </dgm:shape>
+                    <dgm:presOf/>
+                    <dgm:constrLst/>
+                    <dgm:ruleLst/>
+                  </dgm:layoutNode>
+                </dgm:else>
+              </dgm:choose>
+            </dgm:forEach>
+          </dgm:layoutNode>
+        </dgm:layoutNode>
+      </dgm:layoutNode>
+      <dgm:choose name="Name6">
+        <dgm:if name="Name7" axis="self" ptType="node" func="revPos" op="equ" val="1"/>
+        <dgm:else name="Name8">
+          <dgm:layoutNode name="aSpace">
+            <dgm:alg type="sp"/>
+            <dgm:shape xmlns:r="http://schemas.openxmlformats.org/officeDocument/2006/relationships" r:blip="">
+              <dgm:adjLst/>
+            </dgm:shape>
+            <dgm:presOf/>
+            <dgm:constrLst/>
+            <dgm:ruleLst/>
+          </dgm:layoutNode>
+        </dgm:else>
+      </dgm:choose>
+    </dgm:forEach>
+  </dgm:layoutNode>
+</dgm:layoutDef>
+</file>
+
 <file path=ppt/diagrams/quickStyle1.xml><?xml version="1.0" encoding="utf-8"?>
 <dgm:styleDef xmlns:dgm="http://schemas.openxmlformats.org/drawingml/2006/diagram" xmlns:a="http://schemas.openxmlformats.org/drawingml/2006/main" uniqueId="urn:microsoft.com/office/officeart/2005/8/quickstyle/simple1">
   <dgm:title val=""/>
@@ -9997,6 +12858,1040 @@
 </file>
 
 <file path=ppt/diagrams/quickStyle4.xml><?xml version="1.0" encoding="utf-8"?>
+<dgm:styleDef xmlns:dgm="http://schemas.openxmlformats.org/drawingml/2006/diagram" xmlns:a="http://schemas.openxmlformats.org/drawingml/2006/main" uniqueId="urn:microsoft.com/office/officeart/2005/8/quickstyle/simple1">
+  <dgm:title val=""/>
+  <dgm:desc val=""/>
+  <dgm:catLst>
+    <dgm:cat type="simple" pri="10100"/>
+  </dgm:catLst>
+  <dgm:scene3d>
+    <a:camera prst="orthographicFront"/>
+    <a:lightRig rig="threePt" dir="t"/>
+  </dgm:scene3d>
+  <dgm:styleLbl name="node0">
+    <dgm:scene3d>
+      <a:camera prst="orthographicFront"/>
+      <a:lightRig rig="threePt" dir="t"/>
+    </dgm:scene3d>
+    <dgm:sp3d/>
+    <dgm:txPr/>
+    <dgm:style>
+      <a:lnRef idx="2">
+        <a:scrgbClr r="0" g="0" b="0"/>
+      </a:lnRef>
+      <a:fillRef idx="1">
+        <a:scrgbClr r="0" g="0" b="0"/>
+      </a:fillRef>
+      <a:effectRef idx="0">
+        <a:scrgbClr r="0" g="0" b="0"/>
+      </a:effectRef>
+      <a:fontRef idx="minor">
+        <a:schemeClr val="lt1"/>
+      </a:fontRef>
+    </dgm:style>
+  </dgm:styleLbl>
+  <dgm:styleLbl name="lnNode1">
+    <dgm:scene3d>
+      <a:camera prst="orthographicFront"/>
+      <a:lightRig rig="threePt" dir="t"/>
+    </dgm:scene3d>
+    <dgm:sp3d/>
+    <dgm:txPr/>
+    <dgm:style>
+      <a:lnRef idx="2">
+        <a:scrgbClr r="0" g="0" b="0"/>
+      </a:lnRef>
+      <a:fillRef idx="1">
+        <a:scrgbClr r="0" g="0" b="0"/>
+      </a:fillRef>
+      <a:effectRef idx="0">
+        <a:scrgbClr r="0" g="0" b="0"/>
+      </a:effectRef>
+      <a:fontRef idx="minor">
+        <a:schemeClr val="lt1"/>
+      </a:fontRef>
+    </dgm:style>
+  </dgm:styleLbl>
+  <dgm:styleLbl name="vennNode1">
+    <dgm:scene3d>
+      <a:camera prst="orthographicFront"/>
+      <a:lightRig rig="threePt" dir="t"/>
+    </dgm:scene3d>
+    <dgm:sp3d/>
+    <dgm:txPr/>
+    <dgm:style>
+      <a:lnRef idx="2">
+        <a:scrgbClr r="0" g="0" b="0"/>
+      </a:lnRef>
+      <a:fillRef idx="1">
+        <a:scrgbClr r="0" g="0" b="0"/>
+      </a:fillRef>
+      <a:effectRef idx="0">
+        <a:scrgbClr r="0" g="0" b="0"/>
+      </a:effectRef>
+      <a:fontRef idx="minor">
+        <a:schemeClr val="tx1"/>
+      </a:fontRef>
+    </dgm:style>
+  </dgm:styleLbl>
+  <dgm:styleLbl name="alignNode1">
+    <dgm:scene3d>
+      <a:camera prst="orthographicFront"/>
+      <a:lightRig rig="threePt" dir="t"/>
+    </dgm:scene3d>
+    <dgm:sp3d/>
+    <dgm:txPr/>
+    <dgm:style>
+      <a:lnRef idx="2">
+        <a:scrgbClr r="0" g="0" b="0"/>
+      </a:lnRef>
+      <a:fillRef idx="1">
+        <a:scrgbClr r="0" g="0" b="0"/>
+      </a:fillRef>
+      <a:effectRef idx="0">
+        <a:scrgbClr r="0" g="0" b="0"/>
+      </a:effectRef>
+      <a:fontRef idx="minor">
+        <a:schemeClr val="lt1"/>
+      </a:fontRef>
+    </dgm:style>
+  </dgm:styleLbl>
+  <dgm:styleLbl name="node1">
+    <dgm:scene3d>
+      <a:camera prst="orthographicFront"/>
+      <a:lightRig rig="threePt" dir="t"/>
+    </dgm:scene3d>
+    <dgm:sp3d/>
+    <dgm:txPr/>
+    <dgm:style>
+      <a:lnRef idx="2">
+        <a:scrgbClr r="0" g="0" b="0"/>
+      </a:lnRef>
+      <a:fillRef idx="1">
+        <a:scrgbClr r="0" g="0" b="0"/>
+      </a:fillRef>
+      <a:effectRef idx="0">
+        <a:scrgbClr r="0" g="0" b="0"/>
+      </a:effectRef>
+      <a:fontRef idx="minor">
+        <a:schemeClr val="lt1"/>
+      </a:fontRef>
+    </dgm:style>
+  </dgm:styleLbl>
+  <dgm:styleLbl name="node2">
+    <dgm:scene3d>
+      <a:camera prst="orthographicFront"/>
+      <a:lightRig rig="threePt" dir="t"/>
+    </dgm:scene3d>
+    <dgm:sp3d/>
+    <dgm:txPr/>
+    <dgm:style>
+      <a:lnRef idx="2">
+        <a:scrgbClr r="0" g="0" b="0"/>
+      </a:lnRef>
+      <a:fillRef idx="1">
+        <a:scrgbClr r="0" g="0" b="0"/>
+      </a:fillRef>
+      <a:effectRef idx="0">
+        <a:scrgbClr r="0" g="0" b="0"/>
+      </a:effectRef>
+      <a:fontRef idx="minor">
+        <a:schemeClr val="lt1"/>
+      </a:fontRef>
+    </dgm:style>
+  </dgm:styleLbl>
+  <dgm:styleLbl name="node3">
+    <dgm:scene3d>
+      <a:camera prst="orthographicFront"/>
+      <a:lightRig rig="threePt" dir="t"/>
+    </dgm:scene3d>
+    <dgm:sp3d/>
+    <dgm:txPr/>
+    <dgm:style>
+      <a:lnRef idx="2">
+        <a:scrgbClr r="0" g="0" b="0"/>
+      </a:lnRef>
+      <a:fillRef idx="1">
+        <a:scrgbClr r="0" g="0" b="0"/>
+      </a:fillRef>
+      <a:effectRef idx="0">
+        <a:scrgbClr r="0" g="0" b="0"/>
+      </a:effectRef>
+      <a:fontRef idx="minor">
+        <a:schemeClr val="lt1"/>
+      </a:fontRef>
+    </dgm:style>
+  </dgm:styleLbl>
+  <dgm:styleLbl name="node4">
+    <dgm:scene3d>
+      <a:camera prst="orthographicFront"/>
+      <a:lightRig rig="threePt" dir="t"/>
+    </dgm:scene3d>
+    <dgm:sp3d/>
+    <dgm:txPr/>
+    <dgm:style>
+      <a:lnRef idx="2">
+        <a:scrgbClr r="0" g="0" b="0"/>
+      </a:lnRef>
+      <a:fillRef idx="1">
+        <a:scrgbClr r="0" g="0" b="0"/>
+      </a:fillRef>
+      <a:effectRef idx="0">
+        <a:scrgbClr r="0" g="0" b="0"/>
+      </a:effectRef>
+      <a:fontRef idx="minor">
+        <a:schemeClr val="lt1"/>
+      </a:fontRef>
+    </dgm:style>
+  </dgm:styleLbl>
+  <dgm:styleLbl name="fgImgPlace1">
+    <dgm:scene3d>
+      <a:camera prst="orthographicFront"/>
+      <a:lightRig rig="threePt" dir="t"/>
+    </dgm:scene3d>
+    <dgm:sp3d/>
+    <dgm:txPr/>
+    <dgm:style>
+      <a:lnRef idx="2">
+        <a:scrgbClr r="0" g="0" b="0"/>
+      </a:lnRef>
+      <a:fillRef idx="1">
+        <a:scrgbClr r="0" g="0" b="0"/>
+      </a:fillRef>
+      <a:effectRef idx="0">
+        <a:scrgbClr r="0" g="0" b="0"/>
+      </a:effectRef>
+      <a:fontRef idx="minor"/>
+    </dgm:style>
+  </dgm:styleLbl>
+  <dgm:styleLbl name="alignImgPlace1">
+    <dgm:scene3d>
+      <a:camera prst="orthographicFront"/>
+      <a:lightRig rig="threePt" dir="t"/>
+    </dgm:scene3d>
+    <dgm:sp3d/>
+    <dgm:txPr/>
+    <dgm:style>
+      <a:lnRef idx="2">
+        <a:scrgbClr r="0" g="0" b="0"/>
+      </a:lnRef>
+      <a:fillRef idx="1">
+        <a:scrgbClr r="0" g="0" b="0"/>
+      </a:fillRef>
+      <a:effectRef idx="0">
+        <a:scrgbClr r="0" g="0" b="0"/>
+      </a:effectRef>
+      <a:fontRef idx="minor"/>
+    </dgm:style>
+  </dgm:styleLbl>
+  <dgm:styleLbl name="bgImgPlace1">
+    <dgm:scene3d>
+      <a:camera prst="orthographicFront"/>
+      <a:lightRig rig="threePt" dir="t"/>
+    </dgm:scene3d>
+    <dgm:sp3d/>
+    <dgm:txPr/>
+    <dgm:style>
+      <a:lnRef idx="2">
+        <a:scrgbClr r="0" g="0" b="0"/>
+      </a:lnRef>
+      <a:fillRef idx="1">
+        <a:scrgbClr r="0" g="0" b="0"/>
+      </a:fillRef>
+      <a:effectRef idx="0">
+        <a:scrgbClr r="0" g="0" b="0"/>
+      </a:effectRef>
+      <a:fontRef idx="minor"/>
+    </dgm:style>
+  </dgm:styleLbl>
+  <dgm:styleLbl name="sibTrans2D1">
+    <dgm:scene3d>
+      <a:camera prst="orthographicFront"/>
+      <a:lightRig rig="threePt" dir="t"/>
+    </dgm:scene3d>
+    <dgm:sp3d/>
+    <dgm:txPr/>
+    <dgm:style>
+      <a:lnRef idx="0">
+        <a:scrgbClr r="0" g="0" b="0"/>
+      </a:lnRef>
+      <a:fillRef idx="1">
+        <a:scrgbClr r="0" g="0" b="0"/>
+      </a:fillRef>
+      <a:effectRef idx="0">
+        <a:scrgbClr r="0" g="0" b="0"/>
+      </a:effectRef>
+      <a:fontRef idx="minor">
+        <a:schemeClr val="lt1"/>
+      </a:fontRef>
+    </dgm:style>
+  </dgm:styleLbl>
+  <dgm:styleLbl name="fgSibTrans2D1">
+    <dgm:scene3d>
+      <a:camera prst="orthographicFront"/>
+      <a:lightRig rig="threePt" dir="t"/>
+    </dgm:scene3d>
+    <dgm:sp3d/>
+    <dgm:txPr/>
+    <dgm:style>
+      <a:lnRef idx="0">
+        <a:scrgbClr r="0" g="0" b="0"/>
+      </a:lnRef>
+      <a:fillRef idx="1">
+        <a:scrgbClr r="0" g="0" b="0"/>
+      </a:fillRef>
+      <a:effectRef idx="0">
+        <a:scrgbClr r="0" g="0" b="0"/>
+      </a:effectRef>
+      <a:fontRef idx="minor">
+        <a:schemeClr val="lt1"/>
+      </a:fontRef>
+    </dgm:style>
+  </dgm:styleLbl>
+  <dgm:styleLbl name="bgSibTrans2D1">
+    <dgm:scene3d>
+      <a:camera prst="orthographicFront"/>
+      <a:lightRig rig="threePt" dir="t"/>
+    </dgm:scene3d>
+    <dgm:sp3d/>
+    <dgm:txPr/>
+    <dgm:style>
+      <a:lnRef idx="0">
+        <a:scrgbClr r="0" g="0" b="0"/>
+      </a:lnRef>
+      <a:fillRef idx="1">
+        <a:scrgbClr r="0" g="0" b="0"/>
+      </a:fillRef>
+      <a:effectRef idx="0">
+        <a:scrgbClr r="0" g="0" b="0"/>
+      </a:effectRef>
+      <a:fontRef idx="minor">
+        <a:schemeClr val="lt1"/>
+      </a:fontRef>
+    </dgm:style>
+  </dgm:styleLbl>
+  <dgm:styleLbl name="sibTrans1D1">
+    <dgm:scene3d>
+      <a:camera prst="orthographicFront"/>
+      <a:lightRig rig="threePt" dir="t"/>
+    </dgm:scene3d>
+    <dgm:sp3d/>
+    <dgm:txPr/>
+    <dgm:style>
+      <a:lnRef idx="1">
+        <a:scrgbClr r="0" g="0" b="0"/>
+      </a:lnRef>
+      <a:fillRef idx="0">
+        <a:scrgbClr r="0" g="0" b="0"/>
+      </a:fillRef>
+      <a:effectRef idx="0">
+        <a:scrgbClr r="0" g="0" b="0"/>
+      </a:effectRef>
+      <a:fontRef idx="minor"/>
+    </dgm:style>
+  </dgm:styleLbl>
+  <dgm:styleLbl name="callout">
+    <dgm:scene3d>
+      <a:camera prst="orthographicFront"/>
+      <a:lightRig rig="threePt" dir="t"/>
+    </dgm:scene3d>
+    <dgm:sp3d/>
+    <dgm:txPr/>
+    <dgm:style>
+      <a:lnRef idx="2">
+        <a:scrgbClr r="0" g="0" b="0"/>
+      </a:lnRef>
+      <a:fillRef idx="1">
+        <a:scrgbClr r="0" g="0" b="0"/>
+      </a:fillRef>
+      <a:effectRef idx="0">
+        <a:scrgbClr r="0" g="0" b="0"/>
+      </a:effectRef>
+      <a:fontRef idx="minor"/>
+    </dgm:style>
+  </dgm:styleLbl>
+  <dgm:styleLbl name="asst0">
+    <dgm:scene3d>
+      <a:camera prst="orthographicFront"/>
+      <a:lightRig rig="threePt" dir="t"/>
+    </dgm:scene3d>
+    <dgm:sp3d/>
+    <dgm:txPr/>
+    <dgm:style>
+      <a:lnRef idx="2">
+        <a:scrgbClr r="0" g="0" b="0"/>
+      </a:lnRef>
+      <a:fillRef idx="1">
+        <a:scrgbClr r="0" g="0" b="0"/>
+      </a:fillRef>
+      <a:effectRef idx="0">
+        <a:scrgbClr r="0" g="0" b="0"/>
+      </a:effectRef>
+      <a:fontRef idx="minor">
+        <a:schemeClr val="lt1"/>
+      </a:fontRef>
+    </dgm:style>
+  </dgm:styleLbl>
+  <dgm:styleLbl name="asst1">
+    <dgm:scene3d>
+      <a:camera prst="orthographicFront"/>
+      <a:lightRig rig="threePt" dir="t"/>
+    </dgm:scene3d>
+    <dgm:sp3d/>
+    <dgm:txPr/>
+    <dgm:style>
+      <a:lnRef idx="2">
+        <a:scrgbClr r="0" g="0" b="0"/>
+      </a:lnRef>
+      <a:fillRef idx="1">
+        <a:scrgbClr r="0" g="0" b="0"/>
+      </a:fillRef>
+      <a:effectRef idx="0">
+        <a:scrgbClr r="0" g="0" b="0"/>
+      </a:effectRef>
+      <a:fontRef idx="minor">
+        <a:schemeClr val="lt1"/>
+      </a:fontRef>
+    </dgm:style>
+  </dgm:styleLbl>
+  <dgm:styleLbl name="asst2">
+    <dgm:scene3d>
+      <a:camera prst="orthographicFront"/>
+      <a:lightRig rig="threePt" dir="t"/>
+    </dgm:scene3d>
+    <dgm:sp3d/>
+    <dgm:txPr/>
+    <dgm:style>
+      <a:lnRef idx="2">
+        <a:scrgbClr r="0" g="0" b="0"/>
+      </a:lnRef>
+      <a:fillRef idx="1">
+        <a:scrgbClr r="0" g="0" b="0"/>
+      </a:fillRef>
+      <a:effectRef idx="0">
+        <a:scrgbClr r="0" g="0" b="0"/>
+      </a:effectRef>
+      <a:fontRef idx="minor">
+        <a:schemeClr val="lt1"/>
+      </a:fontRef>
+    </dgm:style>
+  </dgm:styleLbl>
+  <dgm:styleLbl name="asst3">
+    <dgm:scene3d>
+      <a:camera prst="orthographicFront"/>
+      <a:lightRig rig="threePt" dir="t"/>
+    </dgm:scene3d>
+    <dgm:sp3d/>
+    <dgm:txPr/>
+    <dgm:style>
+      <a:lnRef idx="2">
+        <a:scrgbClr r="0" g="0" b="0"/>
+      </a:lnRef>
+      <a:fillRef idx="1">
+        <a:scrgbClr r="0" g="0" b="0"/>
+      </a:fillRef>
+      <a:effectRef idx="0">
+        <a:scrgbClr r="0" g="0" b="0"/>
+      </a:effectRef>
+      <a:fontRef idx="minor">
+        <a:schemeClr val="lt1"/>
+      </a:fontRef>
+    </dgm:style>
+  </dgm:styleLbl>
+  <dgm:styleLbl name="asst4">
+    <dgm:scene3d>
+      <a:camera prst="orthographicFront"/>
+      <a:lightRig rig="threePt" dir="t"/>
+    </dgm:scene3d>
+    <dgm:sp3d/>
+    <dgm:txPr/>
+    <dgm:style>
+      <a:lnRef idx="2">
+        <a:scrgbClr r="0" g="0" b="0"/>
+      </a:lnRef>
+      <a:fillRef idx="1">
+        <a:scrgbClr r="0" g="0" b="0"/>
+      </a:fillRef>
+      <a:effectRef idx="0">
+        <a:scrgbClr r="0" g="0" b="0"/>
+      </a:effectRef>
+      <a:fontRef idx="minor">
+        <a:schemeClr val="lt1"/>
+      </a:fontRef>
+    </dgm:style>
+  </dgm:styleLbl>
+  <dgm:styleLbl name="parChTrans2D1">
+    <dgm:scene3d>
+      <a:camera prst="orthographicFront"/>
+      <a:lightRig rig="threePt" dir="t"/>
+    </dgm:scene3d>
+    <dgm:sp3d/>
+    <dgm:txPr/>
+    <dgm:style>
+      <a:lnRef idx="2">
+        <a:scrgbClr r="0" g="0" b="0"/>
+      </a:lnRef>
+      <a:fillRef idx="1">
+        <a:scrgbClr r="0" g="0" b="0"/>
+      </a:fillRef>
+      <a:effectRef idx="0">
+        <a:scrgbClr r="0" g="0" b="0"/>
+      </a:effectRef>
+      <a:fontRef idx="minor">
+        <a:schemeClr val="lt1"/>
+      </a:fontRef>
+    </dgm:style>
+  </dgm:styleLbl>
+  <dgm:styleLbl name="parChTrans2D2">
+    <dgm:scene3d>
+      <a:camera prst="orthographicFront"/>
+      <a:lightRig rig="threePt" dir="t"/>
+    </dgm:scene3d>
+    <dgm:sp3d/>
+    <dgm:txPr/>
+    <dgm:style>
+      <a:lnRef idx="2">
+        <a:scrgbClr r="0" g="0" b="0"/>
+      </a:lnRef>
+      <a:fillRef idx="1">
+        <a:scrgbClr r="0" g="0" b="0"/>
+      </a:fillRef>
+      <a:effectRef idx="0">
+        <a:scrgbClr r="0" g="0" b="0"/>
+      </a:effectRef>
+      <a:fontRef idx="minor">
+        <a:schemeClr val="lt1"/>
+      </a:fontRef>
+    </dgm:style>
+  </dgm:styleLbl>
+  <dgm:styleLbl name="parChTrans2D3">
+    <dgm:scene3d>
+      <a:camera prst="orthographicFront"/>
+      <a:lightRig rig="threePt" dir="t"/>
+    </dgm:scene3d>
+    <dgm:sp3d/>
+    <dgm:txPr/>
+    <dgm:style>
+      <a:lnRef idx="2">
+        <a:scrgbClr r="0" g="0" b="0"/>
+      </a:lnRef>
+      <a:fillRef idx="1">
+        <a:scrgbClr r="0" g="0" b="0"/>
+      </a:fillRef>
+      <a:effectRef idx="0">
+        <a:scrgbClr r="0" g="0" b="0"/>
+      </a:effectRef>
+      <a:fontRef idx="minor">
+        <a:schemeClr val="lt1"/>
+      </a:fontRef>
+    </dgm:style>
+  </dgm:styleLbl>
+  <dgm:styleLbl name="parChTrans2D4">
+    <dgm:scene3d>
+      <a:camera prst="orthographicFront"/>
+      <a:lightRig rig="threePt" dir="t"/>
+    </dgm:scene3d>
+    <dgm:sp3d/>
+    <dgm:txPr/>
+    <dgm:style>
+      <a:lnRef idx="2">
+        <a:scrgbClr r="0" g="0" b="0"/>
+      </a:lnRef>
+      <a:fillRef idx="1">
+        <a:scrgbClr r="0" g="0" b="0"/>
+      </a:fillRef>
+      <a:effectRef idx="0">
+        <a:scrgbClr r="0" g="0" b="0"/>
+      </a:effectRef>
+      <a:fontRef idx="minor">
+        <a:schemeClr val="lt1"/>
+      </a:fontRef>
+    </dgm:style>
+  </dgm:styleLbl>
+  <dgm:styleLbl name="parChTrans1D1">
+    <dgm:scene3d>
+      <a:camera prst="orthographicFront"/>
+      <a:lightRig rig="threePt" dir="t"/>
+    </dgm:scene3d>
+    <dgm:sp3d/>
+    <dgm:txPr/>
+    <dgm:style>
+      <a:lnRef idx="2">
+        <a:scrgbClr r="0" g="0" b="0"/>
+      </a:lnRef>
+      <a:fillRef idx="0">
+        <a:scrgbClr r="0" g="0" b="0"/>
+      </a:fillRef>
+      <a:effectRef idx="0">
+        <a:scrgbClr r="0" g="0" b="0"/>
+      </a:effectRef>
+      <a:fontRef idx="minor"/>
+    </dgm:style>
+  </dgm:styleLbl>
+  <dgm:styleLbl name="parChTrans1D2">
+    <dgm:scene3d>
+      <a:camera prst="orthographicFront"/>
+      <a:lightRig rig="threePt" dir="t"/>
+    </dgm:scene3d>
+    <dgm:sp3d/>
+    <dgm:txPr/>
+    <dgm:style>
+      <a:lnRef idx="2">
+        <a:scrgbClr r="0" g="0" b="0"/>
+      </a:lnRef>
+      <a:fillRef idx="0">
+        <a:scrgbClr r="0" g="0" b="0"/>
+      </a:fillRef>
+      <a:effectRef idx="0">
+        <a:scrgbClr r="0" g="0" b="0"/>
+      </a:effectRef>
+      <a:fontRef idx="minor"/>
+    </dgm:style>
+  </dgm:styleLbl>
+  <dgm:styleLbl name="parChTrans1D3">
+    <dgm:scene3d>
+      <a:camera prst="orthographicFront"/>
+      <a:lightRig rig="threePt" dir="t"/>
+    </dgm:scene3d>
+    <dgm:sp3d/>
+    <dgm:txPr/>
+    <dgm:style>
+      <a:lnRef idx="2">
+        <a:scrgbClr r="0" g="0" b="0"/>
+      </a:lnRef>
+      <a:fillRef idx="0">
+        <a:scrgbClr r="0" g="0" b="0"/>
+      </a:fillRef>
+      <a:effectRef idx="0">
+        <a:scrgbClr r="0" g="0" b="0"/>
+      </a:effectRef>
+      <a:fontRef idx="minor"/>
+    </dgm:style>
+  </dgm:styleLbl>
+  <dgm:styleLbl name="parChTrans1D4">
+    <dgm:scene3d>
+      <a:camera prst="orthographicFront"/>
+      <a:lightRig rig="threePt" dir="t"/>
+    </dgm:scene3d>
+    <dgm:sp3d/>
+    <dgm:txPr/>
+    <dgm:style>
+      <a:lnRef idx="2">
+        <a:scrgbClr r="0" g="0" b="0"/>
+      </a:lnRef>
+      <a:fillRef idx="0">
+        <a:scrgbClr r="0" g="0" b="0"/>
+      </a:fillRef>
+      <a:effectRef idx="0">
+        <a:scrgbClr r="0" g="0" b="0"/>
+      </a:effectRef>
+      <a:fontRef idx="minor"/>
+    </dgm:style>
+  </dgm:styleLbl>
+  <dgm:styleLbl name="fgAcc1">
+    <dgm:scene3d>
+      <a:camera prst="orthographicFront"/>
+      <a:lightRig rig="threePt" dir="t"/>
+    </dgm:scene3d>
+    <dgm:sp3d/>
+    <dgm:txPr/>
+    <dgm:style>
+      <a:lnRef idx="2">
+        <a:scrgbClr r="0" g="0" b="0"/>
+      </a:lnRef>
+      <a:fillRef idx="1">
+        <a:scrgbClr r="0" g="0" b="0"/>
+      </a:fillRef>
+      <a:effectRef idx="0">
+        <a:scrgbClr r="0" g="0" b="0"/>
+      </a:effectRef>
+      <a:fontRef idx="minor"/>
+    </dgm:style>
+  </dgm:styleLbl>
+  <dgm:styleLbl name="conFgAcc1">
+    <dgm:scene3d>
+      <a:camera prst="orthographicFront"/>
+      <a:lightRig rig="threePt" dir="t"/>
+    </dgm:scene3d>
+    <dgm:sp3d/>
+    <dgm:txPr/>
+    <dgm:style>
+      <a:lnRef idx="2">
+        <a:scrgbClr r="0" g="0" b="0"/>
+      </a:lnRef>
+      <a:fillRef idx="1">
+        <a:scrgbClr r="0" g="0" b="0"/>
+      </a:fillRef>
+      <a:effectRef idx="0">
+        <a:scrgbClr r="0" g="0" b="0"/>
+      </a:effectRef>
+      <a:fontRef idx="minor"/>
+    </dgm:style>
+  </dgm:styleLbl>
+  <dgm:styleLbl name="alignAcc1">
+    <dgm:scene3d>
+      <a:camera prst="orthographicFront"/>
+      <a:lightRig rig="threePt" dir="t"/>
+    </dgm:scene3d>
+    <dgm:sp3d/>
+    <dgm:txPr/>
+    <dgm:style>
+      <a:lnRef idx="2">
+        <a:scrgbClr r="0" g="0" b="0"/>
+      </a:lnRef>
+      <a:fillRef idx="1">
+        <a:scrgbClr r="0" g="0" b="0"/>
+      </a:fillRef>
+      <a:effectRef idx="0">
+        <a:scrgbClr r="0" g="0" b="0"/>
+      </a:effectRef>
+      <a:fontRef idx="minor"/>
+    </dgm:style>
+  </dgm:styleLbl>
+  <dgm:styleLbl name="trAlignAcc1">
+    <dgm:scene3d>
+      <a:camera prst="orthographicFront"/>
+      <a:lightRig rig="threePt" dir="t"/>
+    </dgm:scene3d>
+    <dgm:sp3d/>
+    <dgm:txPr/>
+    <dgm:style>
+      <a:lnRef idx="1">
+        <a:scrgbClr r="0" g="0" b="0"/>
+      </a:lnRef>
+      <a:fillRef idx="1">
+        <a:scrgbClr r="0" g="0" b="0"/>
+      </a:fillRef>
+      <a:effectRef idx="0">
+        <a:scrgbClr r="0" g="0" b="0"/>
+      </a:effectRef>
+      <a:fontRef idx="minor"/>
+    </dgm:style>
+  </dgm:styleLbl>
+  <dgm:styleLbl name="bgAcc1">
+    <dgm:scene3d>
+      <a:camera prst="orthographicFront"/>
+      <a:lightRig rig="threePt" dir="t"/>
+    </dgm:scene3d>
+    <dgm:sp3d/>
+    <dgm:txPr/>
+    <dgm:style>
+      <a:lnRef idx="2">
+        <a:scrgbClr r="0" g="0" b="0"/>
+      </a:lnRef>
+      <a:fillRef idx="1">
+        <a:scrgbClr r="0" g="0" b="0"/>
+      </a:fillRef>
+      <a:effectRef idx="0">
+        <a:scrgbClr r="0" g="0" b="0"/>
+      </a:effectRef>
+      <a:fontRef idx="minor"/>
+    </dgm:style>
+  </dgm:styleLbl>
+  <dgm:styleLbl name="solidFgAcc1">
+    <dgm:scene3d>
+      <a:camera prst="orthographicFront"/>
+      <a:lightRig rig="threePt" dir="t"/>
+    </dgm:scene3d>
+    <dgm:sp3d/>
+    <dgm:txPr/>
+    <dgm:style>
+      <a:lnRef idx="2">
+        <a:scrgbClr r="0" g="0" b="0"/>
+      </a:lnRef>
+      <a:fillRef idx="1">
+        <a:scrgbClr r="0" g="0" b="0"/>
+      </a:fillRef>
+      <a:effectRef idx="0">
+        <a:scrgbClr r="0" g="0" b="0"/>
+      </a:effectRef>
+      <a:fontRef idx="minor"/>
+    </dgm:style>
+  </dgm:styleLbl>
+  <dgm:styleLbl name="solidAlignAcc1">
+    <dgm:scene3d>
+      <a:camera prst="orthographicFront"/>
+      <a:lightRig rig="threePt" dir="t"/>
+    </dgm:scene3d>
+    <dgm:sp3d/>
+    <dgm:txPr/>
+    <dgm:style>
+      <a:lnRef idx="2">
+        <a:scrgbClr r="0" g="0" b="0"/>
+      </a:lnRef>
+      <a:fillRef idx="1">
+        <a:scrgbClr r="0" g="0" b="0"/>
+      </a:fillRef>
+      <a:effectRef idx="0">
+        <a:scrgbClr r="0" g="0" b="0"/>
+      </a:effectRef>
+      <a:fontRef idx="minor"/>
+    </dgm:style>
+  </dgm:styleLbl>
+  <dgm:styleLbl name="solidBgAcc1">
+    <dgm:scene3d>
+      <a:camera prst="orthographicFront"/>
+      <a:lightRig rig="threePt" dir="t"/>
+    </dgm:scene3d>
+    <dgm:sp3d/>
+    <dgm:txPr/>
+    <dgm:style>
+      <a:lnRef idx="2">
+        <a:scrgbClr r="0" g="0" b="0"/>
+      </a:lnRef>
+      <a:fillRef idx="1">
+        <a:scrgbClr r="0" g="0" b="0"/>
+      </a:fillRef>
+      <a:effectRef idx="0">
+        <a:scrgbClr r="0" g="0" b="0"/>
+      </a:effectRef>
+      <a:fontRef idx="minor"/>
+    </dgm:style>
+  </dgm:styleLbl>
+  <dgm:styleLbl name="fgAccFollowNode1">
+    <dgm:scene3d>
+      <a:camera prst="orthographicFront"/>
+      <a:lightRig rig="threePt" dir="t"/>
+    </dgm:scene3d>
+    <dgm:sp3d/>
+    <dgm:txPr/>
+    <dgm:style>
+      <a:lnRef idx="2">
+        <a:scrgbClr r="0" g="0" b="0"/>
+      </a:lnRef>
+      <a:fillRef idx="1">
+        <a:scrgbClr r="0" g="0" b="0"/>
+      </a:fillRef>
+      <a:effectRef idx="0">
+        <a:scrgbClr r="0" g="0" b="0"/>
+      </a:effectRef>
+      <a:fontRef idx="minor"/>
+    </dgm:style>
+  </dgm:styleLbl>
+  <dgm:styleLbl name="alignAccFollowNode1">
+    <dgm:scene3d>
+      <a:camera prst="orthographicFront"/>
+      <a:lightRig rig="threePt" dir="t"/>
+    </dgm:scene3d>
+    <dgm:sp3d/>
+    <dgm:txPr/>
+    <dgm:style>
+      <a:lnRef idx="2">
+        <a:scrgbClr r="0" g="0" b="0"/>
+      </a:lnRef>
+      <a:fillRef idx="1">
+        <a:scrgbClr r="0" g="0" b="0"/>
+      </a:fillRef>
+      <a:effectRef idx="0">
+        <a:scrgbClr r="0" g="0" b="0"/>
+      </a:effectRef>
+      <a:fontRef idx="minor"/>
+    </dgm:style>
+  </dgm:styleLbl>
+  <dgm:styleLbl name="bgAccFollowNode1">
+    <dgm:scene3d>
+      <a:camera prst="orthographicFront"/>
+      <a:lightRig rig="threePt" dir="t"/>
+    </dgm:scene3d>
+    <dgm:sp3d/>
+    <dgm:txPr/>
+    <dgm:style>
+      <a:lnRef idx="2">
+        <a:scrgbClr r="0" g="0" b="0"/>
+      </a:lnRef>
+      <a:fillRef idx="1">
+        <a:scrgbClr r="0" g="0" b="0"/>
+      </a:fillRef>
+      <a:effectRef idx="0">
+        <a:scrgbClr r="0" g="0" b="0"/>
+      </a:effectRef>
+      <a:fontRef idx="minor"/>
+    </dgm:style>
+  </dgm:styleLbl>
+  <dgm:styleLbl name="fgAcc0">
+    <dgm:scene3d>
+      <a:camera prst="orthographicFront"/>
+      <a:lightRig rig="threePt" dir="t"/>
+    </dgm:scene3d>
+    <dgm:sp3d/>
+    <dgm:txPr/>
+    <dgm:style>
+      <a:lnRef idx="2">
+        <a:scrgbClr r="0" g="0" b="0"/>
+      </a:lnRef>
+      <a:fillRef idx="1">
+        <a:scrgbClr r="0" g="0" b="0"/>
+      </a:fillRef>
+      <a:effectRef idx="0">
+        <a:scrgbClr r="0" g="0" b="0"/>
+      </a:effectRef>
+      <a:fontRef idx="minor"/>
+    </dgm:style>
+  </dgm:styleLbl>
+  <dgm:styleLbl name="fgAcc2">
+    <dgm:scene3d>
+      <a:camera prst="orthographicFront"/>
+      <a:lightRig rig="threePt" dir="t"/>
+    </dgm:scene3d>
+    <dgm:sp3d/>
+    <dgm:txPr/>
+    <dgm:style>
+      <a:lnRef idx="2">
+        <a:scrgbClr r="0" g="0" b="0"/>
+      </a:lnRef>
+      <a:fillRef idx="1">
+        <a:scrgbClr r="0" g="0" b="0"/>
+      </a:fillRef>
+      <a:effectRef idx="0">
+        <a:scrgbClr r="0" g="0" b="0"/>
+      </a:effectRef>
+      <a:fontRef idx="minor"/>
+    </dgm:style>
+  </dgm:styleLbl>
+  <dgm:styleLbl name="fgAcc3">
+    <dgm:scene3d>
+      <a:camera prst="orthographicFront"/>
+      <a:lightRig rig="threePt" dir="t"/>
+    </dgm:scene3d>
+    <dgm:sp3d/>
+    <dgm:txPr/>
+    <dgm:style>
+      <a:lnRef idx="2">
+        <a:scrgbClr r="0" g="0" b="0"/>
+      </a:lnRef>
+      <a:fillRef idx="1">
+        <a:scrgbClr r="0" g="0" b="0"/>
+      </a:fillRef>
+      <a:effectRef idx="0">
+        <a:scrgbClr r="0" g="0" b="0"/>
+      </a:effectRef>
+      <a:fontRef idx="minor"/>
+    </dgm:style>
+  </dgm:styleLbl>
+  <dgm:styleLbl name="fgAcc4">
+    <dgm:scene3d>
+      <a:camera prst="orthographicFront"/>
+      <a:lightRig rig="threePt" dir="t"/>
+    </dgm:scene3d>
+    <dgm:sp3d/>
+    <dgm:txPr/>
+    <dgm:style>
+      <a:lnRef idx="2">
+        <a:scrgbClr r="0" g="0" b="0"/>
+      </a:lnRef>
+      <a:fillRef idx="1">
+        <a:scrgbClr r="0" g="0" b="0"/>
+      </a:fillRef>
+      <a:effectRef idx="0">
+        <a:scrgbClr r="0" g="0" b="0"/>
+      </a:effectRef>
+      <a:fontRef idx="minor"/>
+    </dgm:style>
+  </dgm:styleLbl>
+  <dgm:styleLbl name="bgShp">
+    <dgm:scene3d>
+      <a:camera prst="orthographicFront"/>
+      <a:lightRig rig="threePt" dir="t"/>
+    </dgm:scene3d>
+    <dgm:sp3d/>
+    <dgm:txPr/>
+    <dgm:style>
+      <a:lnRef idx="0">
+        <a:scrgbClr r="0" g="0" b="0"/>
+      </a:lnRef>
+      <a:fillRef idx="1">
+        <a:scrgbClr r="0" g="0" b="0"/>
+      </a:fillRef>
+      <a:effectRef idx="0">
+        <a:scrgbClr r="0" g="0" b="0"/>
+      </a:effectRef>
+      <a:fontRef idx="minor"/>
+    </dgm:style>
+  </dgm:styleLbl>
+  <dgm:styleLbl name="dkBgShp">
+    <dgm:scene3d>
+      <a:camera prst="orthographicFront"/>
+      <a:lightRig rig="threePt" dir="t"/>
+    </dgm:scene3d>
+    <dgm:sp3d/>
+    <dgm:txPr/>
+    <dgm:style>
+      <a:lnRef idx="0">
+        <a:scrgbClr r="0" g="0" b="0"/>
+      </a:lnRef>
+      <a:fillRef idx="1">
+        <a:scrgbClr r="0" g="0" b="0"/>
+      </a:fillRef>
+      <a:effectRef idx="0">
+        <a:scrgbClr r="0" g="0" b="0"/>
+      </a:effectRef>
+      <a:fontRef idx="minor"/>
+    </dgm:style>
+  </dgm:styleLbl>
+  <dgm:styleLbl name="trBgShp">
+    <dgm:scene3d>
+      <a:camera prst="orthographicFront"/>
+      <a:lightRig rig="threePt" dir="t"/>
+    </dgm:scene3d>
+    <dgm:sp3d/>
+    <dgm:txPr/>
+    <dgm:style>
+      <a:lnRef idx="0">
+        <a:scrgbClr r="0" g="0" b="0"/>
+      </a:lnRef>
+      <a:fillRef idx="1">
+        <a:scrgbClr r="0" g="0" b="0"/>
+      </a:fillRef>
+      <a:effectRef idx="0">
+        <a:scrgbClr r="0" g="0" b="0"/>
+      </a:effectRef>
+      <a:fontRef idx="minor"/>
+    </dgm:style>
+  </dgm:styleLbl>
+  <dgm:styleLbl name="fgShp">
+    <dgm:scene3d>
+      <a:camera prst="orthographicFront"/>
+      <a:lightRig rig="threePt" dir="t"/>
+    </dgm:scene3d>
+    <dgm:sp3d/>
+    <dgm:txPr/>
+    <dgm:style>
+      <a:lnRef idx="2">
+        <a:scrgbClr r="0" g="0" b="0"/>
+      </a:lnRef>
+      <a:fillRef idx="1">
+        <a:scrgbClr r="0" g="0" b="0"/>
+      </a:fillRef>
+      <a:effectRef idx="0">
+        <a:scrgbClr r="0" g="0" b="0"/>
+      </a:effectRef>
+      <a:fontRef idx="minor"/>
+    </dgm:style>
+  </dgm:styleLbl>
+  <dgm:styleLbl name="revTx">
+    <dgm:scene3d>
+      <a:camera prst="orthographicFront"/>
+      <a:lightRig rig="threePt" dir="t"/>
+    </dgm:scene3d>
+    <dgm:sp3d/>
+    <dgm:txPr/>
+    <dgm:style>
+      <a:lnRef idx="0">
+        <a:scrgbClr r="0" g="0" b="0"/>
+      </a:lnRef>
+      <a:fillRef idx="0">
+        <a:scrgbClr r="0" g="0" b="0"/>
+      </a:fillRef>
+      <a:effectRef idx="0">
+        <a:scrgbClr r="0" g="0" b="0"/>
+      </a:effectRef>
+      <a:fontRef idx="minor"/>
+    </dgm:style>
+  </dgm:styleLbl>
+</dgm:styleDef>
+</file>
+
+<file path=ppt/diagrams/quickStyle5.xml><?xml version="1.0" encoding="utf-8"?>
 <dgm:styleDef xmlns:dgm="http://schemas.openxmlformats.org/drawingml/2006/diagram" xmlns:a="http://schemas.openxmlformats.org/drawingml/2006/main" uniqueId="urn:microsoft.com/office/officeart/2005/8/quickstyle/simple1">
   <dgm:title val=""/>
   <dgm:desc val=""/>
@@ -11533,7 +15428,7 @@
             <a:fld id="{B61BEF0D-F0BB-DE4B-95CE-6DB70DBA9567}" type="datetimeFigureOut">
               <a:rPr lang="en-US" smtClean="0"/>
               <a:pPr/>
-              <a:t>12/31/2020</a:t>
+              <a:t>1/11/2021</a:t>
             </a:fld>
             <a:endParaRPr lang="en-US" dirty="0"/>
           </a:p>
@@ -11831,7 +15726,7 @@
             <a:fld id="{B61BEF0D-F0BB-DE4B-95CE-6DB70DBA9567}" type="datetimeFigureOut">
               <a:rPr lang="en-US" smtClean="0"/>
               <a:pPr/>
-              <a:t>12/31/2020</a:t>
+              <a:t>1/11/2021</a:t>
             </a:fld>
             <a:endParaRPr lang="en-US" dirty="0"/>
           </a:p>
@@ -12081,7 +15976,7 @@
             <a:fld id="{B61BEF0D-F0BB-DE4B-95CE-6DB70DBA9567}" type="datetimeFigureOut">
               <a:rPr lang="en-US" smtClean="0"/>
               <a:pPr/>
-              <a:t>12/31/2020</a:t>
+              <a:t>1/11/2021</a:t>
             </a:fld>
             <a:endParaRPr lang="en-US" dirty="0"/>
           </a:p>
@@ -12623,7 +16518,7 @@
             <a:fld id="{B61BEF0D-F0BB-DE4B-95CE-6DB70DBA9567}" type="datetimeFigureOut">
               <a:rPr lang="en-US" smtClean="0"/>
               <a:pPr/>
-              <a:t>12/31/2020</a:t>
+              <a:t>1/11/2021</a:t>
             </a:fld>
             <a:endParaRPr lang="en-US" dirty="0"/>
           </a:p>
@@ -12873,7 +16768,7 @@
             <a:fld id="{B61BEF0D-F0BB-DE4B-95CE-6DB70DBA9567}" type="datetimeFigureOut">
               <a:rPr lang="en-US" smtClean="0"/>
               <a:pPr/>
-              <a:t>12/31/2020</a:t>
+              <a:t>1/11/2021</a:t>
             </a:fld>
             <a:endParaRPr lang="en-US" dirty="0"/>
           </a:p>
@@ -13407,7 +17302,7 @@
             <a:fld id="{B61BEF0D-F0BB-DE4B-95CE-6DB70DBA9567}" type="datetimeFigureOut">
               <a:rPr lang="en-US" smtClean="0"/>
               <a:pPr/>
-              <a:t>12/31/2020</a:t>
+              <a:t>1/11/2021</a:t>
             </a:fld>
             <a:endParaRPr lang="en-US" dirty="0"/>
           </a:p>
@@ -13706,7 +17601,7 @@
             <a:fld id="{B61BEF0D-F0BB-DE4B-95CE-6DB70DBA9567}" type="datetimeFigureOut">
               <a:rPr lang="en-US" smtClean="0"/>
               <a:pPr/>
-              <a:t>12/31/2020</a:t>
+              <a:t>1/11/2021</a:t>
             </a:fld>
             <a:endParaRPr lang="en-US" dirty="0"/>
           </a:p>
@@ -13882,7 +17777,7 @@
             <a:fld id="{B61BEF0D-F0BB-DE4B-95CE-6DB70DBA9567}" type="datetimeFigureOut">
               <a:rPr lang="en-US" smtClean="0"/>
               <a:pPr/>
-              <a:t>12/31/2020</a:t>
+              <a:t>1/11/2021</a:t>
             </a:fld>
             <a:endParaRPr lang="en-US" dirty="0"/>
           </a:p>
@@ -14064,7 +17959,7 @@
             <a:fld id="{B61BEF0D-F0BB-DE4B-95CE-6DB70DBA9567}" type="datetimeFigureOut">
               <a:rPr lang="en-US" smtClean="0"/>
               <a:pPr/>
-              <a:t>12/31/2020</a:t>
+              <a:t>1/11/2021</a:t>
             </a:fld>
             <a:endParaRPr lang="en-US" dirty="0"/>
           </a:p>
@@ -14236,7 +18131,7 @@
             <a:fld id="{B61BEF0D-F0BB-DE4B-95CE-6DB70DBA9567}" type="datetimeFigureOut">
               <a:rPr lang="en-US" smtClean="0"/>
               <a:pPr/>
-              <a:t>12/31/2020</a:t>
+              <a:t>1/11/2021</a:t>
             </a:fld>
             <a:endParaRPr lang="en-US" dirty="0"/>
           </a:p>
@@ -14489,7 +18384,7 @@
             <a:fld id="{B61BEF0D-F0BB-DE4B-95CE-6DB70DBA9567}" type="datetimeFigureOut">
               <a:rPr lang="en-US" smtClean="0"/>
               <a:pPr/>
-              <a:t>12/31/2020</a:t>
+              <a:t>1/11/2021</a:t>
             </a:fld>
             <a:endParaRPr lang="en-US" dirty="0"/>
           </a:p>
@@ -14788,7 +18683,7 @@
             <a:fld id="{B61BEF0D-F0BB-DE4B-95CE-6DB70DBA9567}" type="datetimeFigureOut">
               <a:rPr lang="en-US" smtClean="0"/>
               <a:pPr/>
-              <a:t>12/31/2020</a:t>
+              <a:t>1/11/2021</a:t>
             </a:fld>
             <a:endParaRPr lang="en-US" dirty="0"/>
           </a:p>
@@ -15232,7 +19127,7 @@
             <a:fld id="{B61BEF0D-F0BB-DE4B-95CE-6DB70DBA9567}" type="datetimeFigureOut">
               <a:rPr lang="en-US" smtClean="0"/>
               <a:pPr/>
-              <a:t>12/31/2020</a:t>
+              <a:t>1/11/2021</a:t>
             </a:fld>
             <a:endParaRPr lang="en-US" dirty="0"/>
           </a:p>
@@ -15352,7 +19247,7 @@
             <a:fld id="{B61BEF0D-F0BB-DE4B-95CE-6DB70DBA9567}" type="datetimeFigureOut">
               <a:rPr lang="en-US" smtClean="0"/>
               <a:pPr/>
-              <a:t>12/31/2020</a:t>
+              <a:t>1/11/2021</a:t>
             </a:fld>
             <a:endParaRPr lang="en-US" dirty="0"/>
           </a:p>
@@ -15449,7 +19344,7 @@
             <a:fld id="{B61BEF0D-F0BB-DE4B-95CE-6DB70DBA9567}" type="datetimeFigureOut">
               <a:rPr lang="en-US" smtClean="0"/>
               <a:pPr/>
-              <a:t>12/31/2020</a:t>
+              <a:t>1/11/2021</a:t>
             </a:fld>
             <a:endParaRPr lang="en-US" dirty="0"/>
           </a:p>
@@ -15734,7 +19629,7 @@
             <a:fld id="{B61BEF0D-F0BB-DE4B-95CE-6DB70DBA9567}" type="datetimeFigureOut">
               <a:rPr lang="en-US" smtClean="0"/>
               <a:pPr/>
-              <a:t>12/31/2020</a:t>
+              <a:t>1/11/2021</a:t>
             </a:fld>
             <a:endParaRPr lang="en-US" dirty="0"/>
           </a:p>
@@ -16027,7 +19922,7 @@
             <a:fld id="{B61BEF0D-F0BB-DE4B-95CE-6DB70DBA9567}" type="datetimeFigureOut">
               <a:rPr lang="en-US" smtClean="0"/>
               <a:pPr/>
-              <a:t>12/31/2020</a:t>
+              <a:t>1/11/2021</a:t>
             </a:fld>
             <a:endParaRPr lang="en-US" dirty="0"/>
           </a:p>
@@ -16559,7 +20454,7 @@
             <a:fld id="{B61BEF0D-F0BB-DE4B-95CE-6DB70DBA9567}" type="datetimeFigureOut">
               <a:rPr lang="en-US" smtClean="0"/>
               <a:pPr/>
-              <a:t>12/31/2020</a:t>
+              <a:t>1/11/2021</a:t>
             </a:fld>
             <a:endParaRPr lang="en-US" dirty="0"/>
           </a:p>
@@ -20910,46 +24805,53 @@
         </p:nvSpPr>
         <p:spPr>
           <a:xfrm>
-            <a:off x="1484310" y="0"/>
+            <a:off x="1840926" y="155448"/>
             <a:ext cx="10018713" cy="1197033"/>
           </a:xfrm>
         </p:spPr>
         <p:txBody>
-          <a:bodyPr/>
+          <a:bodyPr>
+            <a:noAutofit/>
+          </a:bodyPr>
           <a:lstStyle/>
           <a:p>
             <a:r>
-              <a:rPr lang="en-US" dirty="0" smtClean="0"/>
-              <a:t>Evaluation</a:t>
-            </a:r>
-            <a:endParaRPr lang="en-US" dirty="0"/>
+              <a:rPr lang="en-US" sz="4800" b="1" dirty="0" smtClean="0"/>
+              <a:t>Qualitative Evaluation : Sem</a:t>
+            </a:r>
+            <a:r>
+              <a:rPr lang="en-US" sz="4800" b="1" dirty="0" smtClean="0"/>
+              <a:t>i-Structured Interview</a:t>
+            </a:r>
+            <a:endParaRPr lang="en-US" sz="4800" b="1" dirty="0"/>
           </a:p>
         </p:txBody>
       </p:sp>
-      <p:sp>
-        <p:nvSpPr>
-          <p:cNvPr id="3" name="Content Placeholder 2"/>
-          <p:cNvSpPr>
-            <a:spLocks noGrp="1"/>
-          </p:cNvSpPr>
+      <p:graphicFrame>
+        <p:nvGraphicFramePr>
+          <p:cNvPr id="5" name="Content Placeholder 4"/>
+          <p:cNvGraphicFramePr>
+            <a:graphicFrameLocks noGrp="1"/>
+          </p:cNvGraphicFramePr>
           <p:nvPr>
             <p:ph idx="1"/>
+            <p:extLst>
+              <p:ext uri="{D42A27DB-BD31-4B8C-83A1-F6EECF244321}">
+                <p14:modId xmlns:p14="http://schemas.microsoft.com/office/powerpoint/2010/main" val="642225395"/>
+              </p:ext>
+            </p:extLst>
           </p:nvPr>
-        </p:nvSpPr>
-        <p:spPr>
-          <a:xfrm>
-            <a:off x="1484310" y="1197033"/>
-            <a:ext cx="10018713" cy="4594167"/>
-          </a:xfrm>
-        </p:spPr>
-        <p:txBody>
-          <a:bodyPr/>
-          <a:lstStyle/>
-          <a:p>
-            <a:endParaRPr lang="en-US" dirty="0"/>
-          </a:p>
-        </p:txBody>
-      </p:sp>
+        </p:nvGraphicFramePr>
+        <p:xfrm>
+          <a:off x="2581524" y="1773104"/>
+          <a:ext cx="8537515" cy="4689441"/>
+        </p:xfrm>
+        <a:graphic>
+          <a:graphicData uri="http://schemas.openxmlformats.org/drawingml/2006/diagram">
+            <dgm:relIds xmlns:dgm="http://schemas.openxmlformats.org/drawingml/2006/diagram" xmlns:r="http://schemas.openxmlformats.org/officeDocument/2006/relationships" r:dm="rId2" r:lo="rId3" r:qs="rId4" r:cs="rId5"/>
+          </a:graphicData>
+        </a:graphic>
+      </p:graphicFrame>
     </p:spTree>
     <p:extLst>
       <p:ext uri="{BB962C8B-B14F-4D97-AF65-F5344CB8AC3E}">
@@ -21426,13 +25328,13 @@
   <p:clrMapOvr>
     <a:masterClrMapping/>
   </p:clrMapOvr>
-  <mc:AlternateContent xmlns:mc="http://schemas.openxmlformats.org/markup-compatibility/2006">
-    <mc:Choice xmlns:p14="http://schemas.microsoft.com/office/powerpoint/2010/main" Requires="p14">
+  <mc:AlternateContent xmlns:mc="http://schemas.openxmlformats.org/markup-compatibility/2006" xmlns:p14="http://schemas.microsoft.com/office/powerpoint/2010/main">
+    <mc:Choice Requires="p14">
       <p:transition spd="slow" p14:dur="1400">
         <p14:doors dir="vert"/>
       </p:transition>
     </mc:Choice>
-    <mc:Fallback>
+    <mc:Fallback xmlns="">
       <p:transition spd="slow">
         <p:fade/>
       </p:transition>

</xml_diff>